<commit_message>
added fancy title dia, slide about charging and slide about system verification
</commit_message>
<xml_diff>
--- a/docs/final-presentation/final-presentation.pptx
+++ b/docs/final-presentation/final-presentation.pptx
@@ -11,8 +11,8 @@
     <p:handoutMasterId r:id="rId6"/>
   </p:handoutMasterIdLst>
   <p:sldIdLst>
-    <p:sldId id="377" r:id="rId2"/>
-    <p:sldId id="378" r:id="rId3"/>
+    <p:sldId id="378" r:id="rId2"/>
+    <p:sldId id="380" r:id="rId3"/>
     <p:sldId id="379" r:id="rId4"/>
   </p:sldIdLst>
   <p:sldSz cx="9144000" cy="6858000" type="screen4x3"/>
@@ -264,7 +264,7 @@
             <a:fld id="{D3646748-BC25-41CA-A659-7F968DC11A47}" type="datetime1">
               <a:rPr lang="en-US"/>
               <a:pPr/>
-              <a:t>6/16/2014</a:t>
+              <a:t>16/06/14</a:t>
             </a:fld>
             <a:endParaRPr lang="en-US"/>
           </a:p>
@@ -364,7 +364,7 @@
             <a:fld id="{B52C0C59-AA4C-4078-A3BC-7C507C177C2D}" type="slidenum">
               <a:rPr lang="en-US"/>
               <a:pPr/>
-              <a:t>‹nr.›</a:t>
+              <a:t>‹#›</a:t>
             </a:fld>
             <a:endParaRPr lang="en-US"/>
           </a:p>
@@ -532,7 +532,7 @@
             <a:tailEnd/>
           </a:ln>
           <a:extLst>
-            <a:ext uri="{909E8E84-426E-40DD-AFC4-6F175D3DCCD1}">
+            <a:ext uri="{909E8E84-426E-40dd-AFC4-6F175D3DCCD1}">
               <a14:hiddenFill xmlns:a14="http://schemas.microsoft.com/office/drawing/2010/main">
                 <a:solidFill>
                   <a:srgbClr val="FFFFFF"/>
@@ -705,7 +705,7 @@
             <a:fld id="{BCFF86D8-912B-44CC-9616-552AE1A16EB1}" type="slidenum">
               <a:rPr lang="en-US"/>
               <a:pPr/>
-              <a:t>‹nr.›</a:t>
+              <a:t>‹#›</a:t>
             </a:fld>
             <a:endParaRPr lang="en-US"/>
           </a:p>
@@ -2994,14 +2994,14 @@
             <a:noFill/>
           </a:ln>
           <a:extLst>
-            <a:ext uri="{909E8E84-426E-40DD-AFC4-6F175D3DCCD1}">
+            <a:ext uri="{909E8E84-426E-40dd-AFC4-6F175D3DCCD1}">
               <a14:hiddenFill xmlns:a14="http://schemas.microsoft.com/office/drawing/2010/main">
                 <a:solidFill>
                   <a:srgbClr val="FFFFFF"/>
                 </a:solidFill>
               </a14:hiddenFill>
             </a:ext>
-            <a:ext uri="{91240B29-F687-4F45-9708-019B960494DF}">
+            <a:ext uri="{91240B29-F687-4f45-9708-019B960494DF}">
               <a14:hiddenLine xmlns:a14="http://schemas.microsoft.com/office/drawing/2010/main" w="9525">
                 <a:solidFill>
                   <a:srgbClr val="000000"/>
@@ -3056,14 +3056,14 @@
             <a:noFill/>
           </a:ln>
           <a:extLst>
-            <a:ext uri="{909E8E84-426E-40DD-AFC4-6F175D3DCCD1}">
+            <a:ext uri="{909E8E84-426E-40dd-AFC4-6F175D3DCCD1}">
               <a14:hiddenFill xmlns:a14="http://schemas.microsoft.com/office/drawing/2010/main">
                 <a:solidFill>
                   <a:srgbClr val="FFFFFF"/>
                 </a:solidFill>
               </a14:hiddenFill>
             </a:ext>
-            <a:ext uri="{91240B29-F687-4F45-9708-019B960494DF}">
+            <a:ext uri="{91240B29-F687-4f45-9708-019B960494DF}">
               <a14:hiddenLine xmlns:a14="http://schemas.microsoft.com/office/drawing/2010/main" w="9525">
                 <a:solidFill>
                   <a:srgbClr val="000000"/>
@@ -3391,14 +3391,14 @@
             <a:noFill/>
           </a:ln>
           <a:extLst>
-            <a:ext uri="{909E8E84-426E-40DD-AFC4-6F175D3DCCD1}">
+            <a:ext uri="{909E8E84-426E-40dd-AFC4-6F175D3DCCD1}">
               <a14:hiddenFill xmlns:a14="http://schemas.microsoft.com/office/drawing/2010/main">
                 <a:solidFill>
                   <a:srgbClr val="FFFFFF"/>
                 </a:solidFill>
               </a14:hiddenFill>
             </a:ext>
-            <a:ext uri="{91240B29-F687-4F45-9708-019B960494DF}">
+            <a:ext uri="{91240B29-F687-4f45-9708-019B960494DF}">
               <a14:hiddenLine xmlns:a14="http://schemas.microsoft.com/office/drawing/2010/main" w="9525">
                 <a:solidFill>
                   <a:srgbClr val="000000"/>
@@ -3446,7 +3446,7 @@
                 <a:ea typeface="ＭＳ Ｐゴシック" charset="-128"/>
               </a:rPr>
               <a:pPr algn="r"/>
-              <a:t>‹nr.›</a:t>
+              <a:t>‹#›</a:t>
             </a:fld>
             <a:endParaRPr lang="nl-NL" sz="1100">
               <a:ea typeface="ＭＳ Ｐゴシック" charset="-128"/>
@@ -3512,7 +3512,7 @@
   <p:timing>
     <p:tnLst>
       <p:par>
-        <p:cTn id="1" dur="indefinite" restart="never" nodeType="tmRoot"/>
+        <p:cTn xmlns:p14="http://schemas.microsoft.com/office/powerpoint/2010/main" id="1" dur="indefinite" restart="never" nodeType="tmRoot"/>
       </p:par>
     </p:tnLst>
   </p:timing>
@@ -3977,27 +3977,145 @@
           <a:chExt cx="0" cy="0"/>
         </a:xfrm>
       </p:grpSpPr>
+      <p:pic>
+        <p:nvPicPr>
+          <p:cNvPr id="6" name="Picture 5" descr="Screen Shot 2014-06-16 at 23.59.42.png"/>
+          <p:cNvPicPr>
+            <a:picLocks noChangeAspect="1"/>
+          </p:cNvPicPr>
+          <p:nvPr/>
+        </p:nvPicPr>
+        <p:blipFill>
+          <a:blip r:embed="rId2">
+            <a:extLst>
+              <a:ext uri="{28A0092B-C50C-407E-A947-70E740481C1C}">
+                <a14:useLocalDpi xmlns:a14="http://schemas.microsoft.com/office/drawing/2010/main" val="0"/>
+              </a:ext>
+            </a:extLst>
+          </a:blip>
+          <a:stretch>
+            <a:fillRect/>
+          </a:stretch>
+        </p:blipFill>
+        <p:spPr>
+          <a:xfrm>
+            <a:off x="6823314" y="4005934"/>
+            <a:ext cx="2320685" cy="2082667"/>
+          </a:xfrm>
+          <a:prstGeom prst="rect">
+            <a:avLst/>
+          </a:prstGeom>
+        </p:spPr>
+      </p:pic>
+      <p:pic>
+        <p:nvPicPr>
+          <p:cNvPr id="7" name="Picture 6" descr="Screen Shot 2014-06-16 at 23.59.35.png"/>
+          <p:cNvPicPr>
+            <a:picLocks noChangeAspect="1"/>
+          </p:cNvPicPr>
+          <p:nvPr/>
+        </p:nvPicPr>
+        <p:blipFill>
+          <a:blip r:embed="rId3">
+            <a:extLst>
+              <a:ext uri="{28A0092B-C50C-407E-A947-70E740481C1C}">
+                <a14:useLocalDpi xmlns:a14="http://schemas.microsoft.com/office/drawing/2010/main" val="0"/>
+              </a:ext>
+            </a:extLst>
+          </a:blip>
+          <a:stretch>
+            <a:fillRect/>
+          </a:stretch>
+        </p:blipFill>
+        <p:spPr>
+          <a:xfrm>
+            <a:off x="0" y="3969921"/>
+            <a:ext cx="4395420" cy="2159452"/>
+          </a:xfrm>
+          <a:prstGeom prst="rect">
+            <a:avLst/>
+          </a:prstGeom>
+        </p:spPr>
+      </p:pic>
+      <p:pic>
+        <p:nvPicPr>
+          <p:cNvPr id="8" name="Picture 7" descr="Screen Shot 2014-06-16 at 23.59.46.png"/>
+          <p:cNvPicPr>
+            <a:picLocks noChangeAspect="1"/>
+          </p:cNvPicPr>
+          <p:nvPr/>
+        </p:nvPicPr>
+        <p:blipFill>
+          <a:blip r:embed="rId4">
+            <a:extLst>
+              <a:ext uri="{28A0092B-C50C-407E-A947-70E740481C1C}">
+                <a14:useLocalDpi xmlns:a14="http://schemas.microsoft.com/office/drawing/2010/main" val="0"/>
+              </a:ext>
+            </a:extLst>
+          </a:blip>
+          <a:stretch>
+            <a:fillRect/>
+          </a:stretch>
+        </p:blipFill>
+        <p:spPr>
+          <a:xfrm>
+            <a:off x="4332912" y="3997494"/>
+            <a:ext cx="2564181" cy="2089954"/>
+          </a:xfrm>
+          <a:prstGeom prst="rect">
+            <a:avLst/>
+          </a:prstGeom>
+        </p:spPr>
+      </p:pic>
+      <p:pic>
+        <p:nvPicPr>
+          <p:cNvPr id="9" name="Picture 8" descr="Screen Shot 2014-06-17 at 00.03.18.png"/>
+          <p:cNvPicPr>
+            <a:picLocks noChangeAspect="1"/>
+          </p:cNvPicPr>
+          <p:nvPr/>
+        </p:nvPicPr>
+        <p:blipFill>
+          <a:blip r:embed="rId5">
+            <a:extLst>
+              <a:ext uri="{28A0092B-C50C-407E-A947-70E740481C1C}">
+                <a14:useLocalDpi xmlns:a14="http://schemas.microsoft.com/office/drawing/2010/main" val="0"/>
+              </a:ext>
+            </a:extLst>
+          </a:blip>
+          <a:stretch>
+            <a:fillRect/>
+          </a:stretch>
+        </p:blipFill>
+        <p:spPr>
+          <a:xfrm>
+            <a:off x="2751776" y="534051"/>
+            <a:ext cx="6392224" cy="1511070"/>
+          </a:xfrm>
+          <a:prstGeom prst="rect">
+            <a:avLst/>
+          </a:prstGeom>
+        </p:spPr>
+      </p:pic>
       <p:sp>
         <p:nvSpPr>
-          <p:cNvPr id="2" name="Rechthoek 1"/>
+          <p:cNvPr id="10" name="Rectangle 9"/>
           <p:cNvSpPr/>
           <p:nvPr/>
         </p:nvSpPr>
         <p:spPr bwMode="auto">
           <a:xfrm>
-            <a:off x="469901" y="3952875"/>
-            <a:ext cx="7308850" cy="465215"/>
+            <a:off x="-1" y="0"/>
+            <a:ext cx="1452529" cy="2408279"/>
           </a:xfrm>
           <a:prstGeom prst="rect">
             <a:avLst/>
           </a:prstGeom>
           <a:solidFill>
-            <a:schemeClr val="tx1"/>
+            <a:schemeClr val="bg1"/>
           </a:solidFill>
           <a:ln w="9525" cap="flat" cmpd="sng" algn="ctr">
-            <a:solidFill>
-              <a:schemeClr val="tx1"/>
-            </a:solidFill>
+            <a:noFill/>
             <a:prstDash val="solid"/>
             <a:round/>
             <a:headEnd type="none" w="med" len="med"/>
@@ -4029,7 +4147,7 @@
               <a:buNone/>
               <a:tabLst/>
             </a:pPr>
-            <a:endParaRPr kumimoji="0" lang="nl-NL" sz="2400" b="0" i="0" u="none" strike="noStrike" cap="none" normalizeH="0" baseline="0" smtClean="0">
+            <a:endParaRPr kumimoji="0" lang="en-US" sz="2400" b="0" i="0" u="none" strike="noStrike" cap="none" normalizeH="0" baseline="0" smtClean="0">
               <a:ln>
                 <a:noFill/>
               </a:ln>
@@ -4043,35 +4161,292 @@
           </a:p>
         </p:txBody>
       </p:sp>
+      <p:pic>
+        <p:nvPicPr>
+          <p:cNvPr id="11" name="Picture 10" descr="Screen Shot 2014-06-17 at 00.03.23.png"/>
+          <p:cNvPicPr>
+            <a:picLocks noChangeAspect="1"/>
+          </p:cNvPicPr>
+          <p:nvPr/>
+        </p:nvPicPr>
+        <p:blipFill>
+          <a:blip r:embed="rId6">
+            <a:extLst>
+              <a:ext uri="{28A0092B-C50C-407E-A947-70E740481C1C}">
+                <a14:useLocalDpi xmlns:a14="http://schemas.microsoft.com/office/drawing/2010/main" val="0"/>
+              </a:ext>
+            </a:extLst>
+          </a:blip>
+          <a:stretch>
+            <a:fillRect/>
+          </a:stretch>
+        </p:blipFill>
+        <p:spPr>
+          <a:xfrm>
+            <a:off x="-1" y="491837"/>
+            <a:ext cx="2885647" cy="1534725"/>
+          </a:xfrm>
+          <a:prstGeom prst="rect">
+            <a:avLst/>
+          </a:prstGeom>
+        </p:spPr>
+      </p:pic>
       <p:sp>
         <p:nvSpPr>
-          <p:cNvPr id="17410" name="Rectangle 5"/>
-          <p:cNvSpPr>
-            <a:spLocks noChangeArrowheads="1"/>
+          <p:cNvPr id="12" name="Rectangle 11"/>
+          <p:cNvSpPr/>
+          <p:nvPr/>
+        </p:nvSpPr>
+        <p:spPr bwMode="auto">
+          <a:xfrm>
+            <a:off x="0" y="6575041"/>
+            <a:ext cx="9144000" cy="282959"/>
+          </a:xfrm>
+          <a:prstGeom prst="rect">
+            <a:avLst/>
+          </a:prstGeom>
+          <a:solidFill>
+            <a:schemeClr val="bg1"/>
+          </a:solidFill>
+          <a:ln w="9525" cap="flat" cmpd="sng" algn="ctr">
+            <a:noFill/>
+            <a:prstDash val="solid"/>
+            <a:round/>
+            <a:headEnd type="none" w="med" len="med"/>
+            <a:tailEnd type="none" w="med" len="med"/>
+          </a:ln>
+          <a:effectLst/>
+        </p:spPr>
+        <p:txBody>
+          <a:bodyPr vert="horz" wrap="square" lIns="91440" tIns="45720" rIns="91440" bIns="45720" numCol="1" rtlCol="0" anchor="t" anchorCtr="0" compatLnSpc="1">
+            <a:prstTxWarp prst="textNoShape">
+              <a:avLst/>
+            </a:prstTxWarp>
+          </a:bodyPr>
+          <a:lstStyle/>
+          <a:p>
+            <a:pPr marL="0" marR="0" indent="0" algn="l" defTabSz="914400" rtl="0" eaLnBrk="0" fontAlgn="base" latinLnBrk="0" hangingPunct="0">
+              <a:lnSpc>
+                <a:spcPct val="100000"/>
+              </a:lnSpc>
+              <a:spcBef>
+                <a:spcPct val="0"/>
+              </a:spcBef>
+              <a:spcAft>
+                <a:spcPct val="0"/>
+              </a:spcAft>
+              <a:buClrTx/>
+              <a:buSzTx/>
+              <a:buFontTx/>
+              <a:buNone/>
+              <a:tabLst/>
+            </a:pPr>
+            <a:endParaRPr kumimoji="0" lang="en-US" sz="2400" b="0" i="0" u="none" strike="noStrike" cap="none" normalizeH="0" baseline="0" smtClean="0">
+              <a:ln>
+                <a:noFill/>
+              </a:ln>
+              <a:solidFill>
+                <a:schemeClr val="tx1"/>
+              </a:solidFill>
+              <a:effectLst/>
+              <a:latin typeface="Arial" charset="0"/>
+              <a:ea typeface="ＭＳ Ｐゴシック" pitchFamily="1" charset="-128"/>
+            </a:endParaRPr>
+          </a:p>
+        </p:txBody>
+      </p:sp>
+      <p:sp>
+        <p:nvSpPr>
+          <p:cNvPr id="13" name="Rectangle 12"/>
+          <p:cNvSpPr/>
+          <p:nvPr/>
+        </p:nvSpPr>
+        <p:spPr bwMode="auto">
+          <a:xfrm>
+            <a:off x="0" y="5978881"/>
+            <a:ext cx="9144000" cy="181440"/>
+          </a:xfrm>
+          <a:prstGeom prst="rect">
+            <a:avLst/>
+          </a:prstGeom>
+          <a:solidFill>
+            <a:schemeClr val="bg1"/>
+          </a:solidFill>
+          <a:ln w="9525" cap="flat" cmpd="sng" algn="ctr">
+            <a:noFill/>
+            <a:prstDash val="solid"/>
+            <a:round/>
+            <a:headEnd type="none" w="med" len="med"/>
+            <a:tailEnd type="none" w="med" len="med"/>
+          </a:ln>
+          <a:effectLst/>
+        </p:spPr>
+        <p:txBody>
+          <a:bodyPr vert="horz" wrap="square" lIns="91440" tIns="45720" rIns="91440" bIns="45720" numCol="1" rtlCol="0" anchor="t" anchorCtr="0" compatLnSpc="1">
+            <a:prstTxWarp prst="textNoShape">
+              <a:avLst/>
+            </a:prstTxWarp>
+          </a:bodyPr>
+          <a:lstStyle/>
+          <a:p>
+            <a:pPr marL="0" marR="0" indent="0" algn="l" defTabSz="914400" rtl="0" eaLnBrk="0" fontAlgn="base" latinLnBrk="0" hangingPunct="0">
+              <a:lnSpc>
+                <a:spcPct val="100000"/>
+              </a:lnSpc>
+              <a:spcBef>
+                <a:spcPct val="0"/>
+              </a:spcBef>
+              <a:spcAft>
+                <a:spcPct val="0"/>
+              </a:spcAft>
+              <a:buClrTx/>
+              <a:buSzTx/>
+              <a:buFontTx/>
+              <a:buNone/>
+              <a:tabLst/>
+            </a:pPr>
+            <a:endParaRPr kumimoji="0" lang="en-US" sz="2400" b="0" i="0" u="none" strike="noStrike" cap="none" normalizeH="0" baseline="0" smtClean="0">
+              <a:ln>
+                <a:noFill/>
+              </a:ln>
+              <a:solidFill>
+                <a:schemeClr val="tx1"/>
+              </a:solidFill>
+              <a:effectLst/>
+              <a:latin typeface="Arial" charset="0"/>
+              <a:ea typeface="ＭＳ Ｐゴシック" pitchFamily="1" charset="-128"/>
+            </a:endParaRPr>
+          </a:p>
+        </p:txBody>
+      </p:sp>
+      <p:sp>
+        <p:nvSpPr>
+          <p:cNvPr id="14" name="Rectangle 13"/>
+          <p:cNvSpPr/>
+          <p:nvPr/>
+        </p:nvSpPr>
+        <p:spPr bwMode="auto">
+          <a:xfrm>
+            <a:off x="5465791" y="5975760"/>
+            <a:ext cx="3528095" cy="882240"/>
+          </a:xfrm>
+          <a:prstGeom prst="rect">
+            <a:avLst/>
+          </a:prstGeom>
+          <a:solidFill>
+            <a:schemeClr val="bg1"/>
+          </a:solidFill>
+          <a:ln w="9525" cap="flat" cmpd="sng" algn="ctr">
+            <a:noFill/>
+            <a:prstDash val="solid"/>
+            <a:round/>
+            <a:headEnd type="none" w="med" len="med"/>
+            <a:tailEnd type="none" w="med" len="med"/>
+          </a:ln>
+          <a:effectLst/>
+        </p:spPr>
+        <p:txBody>
+          <a:bodyPr vert="horz" wrap="square" lIns="91440" tIns="45720" rIns="91440" bIns="45720" numCol="1" rtlCol="0" anchor="t" anchorCtr="0" compatLnSpc="1">
+            <a:prstTxWarp prst="textNoShape">
+              <a:avLst/>
+            </a:prstTxWarp>
+          </a:bodyPr>
+          <a:lstStyle/>
+          <a:p>
+            <a:pPr marL="0" marR="0" indent="0" algn="l" defTabSz="914400" rtl="0" eaLnBrk="0" fontAlgn="base" latinLnBrk="0" hangingPunct="0">
+              <a:lnSpc>
+                <a:spcPct val="100000"/>
+              </a:lnSpc>
+              <a:spcBef>
+                <a:spcPct val="0"/>
+              </a:spcBef>
+              <a:spcAft>
+                <a:spcPct val="0"/>
+              </a:spcAft>
+              <a:buClrTx/>
+              <a:buSzTx/>
+              <a:buFontTx/>
+              <a:buNone/>
+              <a:tabLst/>
+            </a:pPr>
+            <a:endParaRPr kumimoji="0" lang="en-US" sz="2400" b="0" i="0" u="none" strike="noStrike" cap="none" normalizeH="0" baseline="0" smtClean="0">
+              <a:ln>
+                <a:noFill/>
+              </a:ln>
+              <a:solidFill>
+                <a:schemeClr val="tx1"/>
+              </a:solidFill>
+              <a:effectLst/>
+              <a:latin typeface="Arial" charset="0"/>
+              <a:ea typeface="ＭＳ Ｐゴシック" pitchFamily="1" charset="-128"/>
+            </a:endParaRPr>
+          </a:p>
+        </p:txBody>
+      </p:sp>
+      <p:pic>
+        <p:nvPicPr>
+          <p:cNvPr id="15" name="Picture 14" descr="Screen Shot 2014-06-17 at 00.03.29.png"/>
+          <p:cNvPicPr>
+            <a:picLocks noChangeAspect="1"/>
+          </p:cNvPicPr>
+          <p:nvPr/>
+        </p:nvPicPr>
+        <p:blipFill>
+          <a:blip r:embed="rId7">
+            <a:extLst>
+              <a:ext uri="{28A0092B-C50C-407E-A947-70E740481C1C}">
+                <a14:useLocalDpi xmlns:a14="http://schemas.microsoft.com/office/drawing/2010/main" val="0"/>
+              </a:ext>
+            </a:extLst>
+          </a:blip>
+          <a:stretch>
+            <a:fillRect/>
+          </a:stretch>
+        </p:blipFill>
+        <p:spPr>
+          <a:xfrm>
+            <a:off x="0" y="1961280"/>
+            <a:ext cx="9144000" cy="1624320"/>
+          </a:xfrm>
+          <a:prstGeom prst="rect">
+            <a:avLst/>
+          </a:prstGeom>
+        </p:spPr>
+      </p:pic>
+      <p:sp>
+        <p:nvSpPr>
+          <p:cNvPr id="16" name="Subtitle 4"/>
+          <p:cNvSpPr txBox="1">
+            <a:spLocks/>
           </p:cNvSpPr>
           <p:nvPr/>
         </p:nvSpPr>
         <p:spPr bwMode="auto">
           <a:xfrm>
-            <a:off x="471489" y="2055813"/>
-            <a:ext cx="7307262" cy="1897062"/>
+            <a:off x="1904280" y="2239645"/>
+            <a:ext cx="6781800" cy="856491"/>
           </a:xfrm>
           <a:prstGeom prst="rect">
             <a:avLst/>
           </a:prstGeom>
-          <a:solidFill>
-            <a:schemeClr val="tx1"/>
-          </a:solidFill>
+          <a:noFill/>
           <a:ln>
             <a:noFill/>
           </a:ln>
           <a:extLst>
-            <a:ext uri="{91240B29-F687-4F45-9708-019B960494DF}">
+            <a:ext uri="{909E8E84-426E-40dd-AFC4-6F175D3DCCD1}">
+              <a14:hiddenFill xmlns:a14="http://schemas.microsoft.com/office/drawing/2010/main">
+                <a:solidFill>
+                  <a:srgbClr val="FFFFFF"/>
+                </a:solidFill>
+              </a14:hiddenFill>
+            </a:ext>
+            <a:ext uri="{91240B29-F687-4f45-9708-019B960494DF}">
               <a14:hiddenLine xmlns:a14="http://schemas.microsoft.com/office/drawing/2010/main" w="9525">
                 <a:solidFill>
                   <a:srgbClr val="000000"/>
                 </a:solidFill>
-                <a:round/>
+                <a:miter lim="800000"/>
                 <a:headEnd/>
                 <a:tailEnd/>
               </a14:hiddenLine>
@@ -4079,150 +4454,261 @@
           </a:extLst>
         </p:spPr>
         <p:txBody>
-          <a:bodyPr/>
-          <a:lstStyle/>
-          <a:p>
-            <a:pPr algn="l" eaLnBrk="0" hangingPunct="0"/>
-            <a:endParaRPr lang="nl-NL">
-              <a:latin typeface="Arial" charset="0"/>
-              <a:ea typeface="ＭＳ Ｐゴシック" charset="-128"/>
-            </a:endParaRPr>
-          </a:p>
-        </p:txBody>
-      </p:sp>
-      <p:sp>
-        <p:nvSpPr>
-          <p:cNvPr id="17411" name="Title 3"/>
-          <p:cNvSpPr>
-            <a:spLocks noGrp="1"/>
-          </p:cNvSpPr>
-          <p:nvPr>
-            <p:ph type="ctrTitle"/>
-          </p:nvPr>
-        </p:nvSpPr>
-        <p:spPr>
-          <a:xfrm>
-            <a:off x="685800" y="2155825"/>
-            <a:ext cx="6799263" cy="587375"/>
-          </a:xfrm>
-        </p:spPr>
-        <p:txBody>
-          <a:bodyPr/>
-          <a:lstStyle/>
-          <a:p>
-            <a:pPr marL="0" indent="0"/>
-            <a:r>
-              <a:rPr lang="en-US" dirty="0" smtClean="0"/>
-              <a:t>EPO4 – Final presentation</a:t>
-            </a:r>
-            <a:endParaRPr lang="en-US" dirty="0" smtClean="0"/>
-          </a:p>
-        </p:txBody>
-      </p:sp>
-      <p:sp>
-        <p:nvSpPr>
-          <p:cNvPr id="17412" name="Subtitle 4"/>
-          <p:cNvSpPr>
-            <a:spLocks noGrp="1"/>
-          </p:cNvSpPr>
-          <p:nvPr>
-            <p:ph type="subTitle" idx="1"/>
-          </p:nvPr>
-        </p:nvSpPr>
-        <p:spPr>
-          <a:xfrm>
-            <a:off x="734219" y="2714845"/>
-            <a:ext cx="6781800" cy="856491"/>
-          </a:xfrm>
-        </p:spPr>
-        <p:txBody>
-          <a:bodyPr/>
-          <a:lstStyle/>
-          <a:p>
-            <a:r>
-              <a:rPr lang="nl-NL" dirty="0" smtClean="0"/>
-              <a:t>Electric Transport 2020</a:t>
-            </a:r>
-            <a:endParaRPr lang="nl-NL" dirty="0" smtClean="0"/>
-          </a:p>
-          <a:p>
-            <a:r>
-              <a:rPr lang="nl-NL" sz="1800" dirty="0" smtClean="0">
+          <a:bodyPr vert="horz" wrap="square" lIns="0" tIns="0" rIns="0" bIns="0" numCol="1" anchor="t" anchorCtr="0" compatLnSpc="1">
+            <a:prstTxWarp prst="textNoShape">
+              <a:avLst/>
+            </a:prstTxWarp>
+          </a:bodyPr>
+          <a:lstStyle>
+            <a:lvl1pPr marL="195263" indent="-195263" algn="l" rtl="0" eaLnBrk="0" fontAlgn="base" hangingPunct="0">
+              <a:lnSpc>
+                <a:spcPts val="2500"/>
+              </a:lnSpc>
+              <a:spcBef>
+                <a:spcPct val="0"/>
+              </a:spcBef>
+              <a:spcAft>
+                <a:spcPct val="0"/>
+              </a:spcAft>
+              <a:buClr>
+                <a:srgbClr val="00A6D6"/>
+              </a:buClr>
+              <a:buChar char="•"/>
+              <a:defRPr sz="2000">
                 <a:solidFill>
-                  <a:schemeClr val="bg1"/>
+                  <a:schemeClr val="tx1"/>
                 </a:solidFill>
                 <a:latin typeface="+mn-lt"/>
-              </a:rPr>
-              <a:t>Group B2 – Julio Ballesteros, Sjoerd Bosma, Wessel Bruinsma, Robin Hes</a:t>
-            </a:r>
-            <a:endParaRPr lang="nl-NL" sz="1800" dirty="0">
-              <a:solidFill>
-                <a:schemeClr val="bg1"/>
-              </a:solidFill>
-              <a:latin typeface="+mn-lt"/>
-            </a:endParaRPr>
-          </a:p>
-          <a:p>
-            <a:r>
-              <a:rPr lang="en-US" sz="1800" dirty="0" smtClean="0">
+                <a:ea typeface="ＭＳ Ｐゴシック" charset="-128"/>
+                <a:cs typeface="ＭＳ Ｐゴシック" charset="-128"/>
+              </a:defRPr>
+            </a:lvl1pPr>
+            <a:lvl2pPr marL="576263" indent="-190500" algn="l" rtl="0" eaLnBrk="0" fontAlgn="base" hangingPunct="0">
+              <a:lnSpc>
+                <a:spcPts val="2500"/>
+              </a:lnSpc>
+              <a:spcBef>
+                <a:spcPct val="0"/>
+              </a:spcBef>
+              <a:spcAft>
+                <a:spcPct val="0"/>
+              </a:spcAft>
+              <a:buClr>
+                <a:srgbClr val="00A6D6"/>
+              </a:buClr>
+              <a:buFont typeface="Times" charset="0"/>
+              <a:buChar char="•"/>
+              <a:defRPr>
                 <a:solidFill>
-                  <a:schemeClr val="bg1"/>
+                  <a:schemeClr val="tx1"/>
                 </a:solidFill>
                 <a:latin typeface="+mn-lt"/>
+                <a:ea typeface="ＭＳ Ｐゴシック" charset="-128"/>
+              </a:defRPr>
+            </a:lvl2pPr>
+            <a:lvl3pPr marL="957263" indent="-190500" algn="l" rtl="0" eaLnBrk="0" fontAlgn="base" hangingPunct="0">
+              <a:lnSpc>
+                <a:spcPts val="2500"/>
+              </a:lnSpc>
+              <a:spcBef>
+                <a:spcPct val="0"/>
+              </a:spcBef>
+              <a:spcAft>
+                <a:spcPct val="0"/>
+              </a:spcAft>
+              <a:buClr>
+                <a:srgbClr val="00A6D6"/>
+              </a:buClr>
+              <a:buFont typeface="Times" charset="0"/>
+              <a:buChar char="•"/>
+              <a:defRPr sz="1600">
+                <a:solidFill>
+                  <a:schemeClr val="tx1"/>
+                </a:solidFill>
+                <a:latin typeface="+mn-lt"/>
+                <a:ea typeface="ＭＳ Ｐゴシック" charset="-128"/>
+              </a:defRPr>
+            </a:lvl3pPr>
+            <a:lvl4pPr marL="1338263" indent="-190500" algn="l" rtl="0" eaLnBrk="0" fontAlgn="base" hangingPunct="0">
+              <a:lnSpc>
+                <a:spcPts val="2500"/>
+              </a:lnSpc>
+              <a:spcBef>
+                <a:spcPct val="0"/>
+              </a:spcBef>
+              <a:spcAft>
+                <a:spcPct val="0"/>
+              </a:spcAft>
+              <a:buClr>
+                <a:schemeClr val="bg2"/>
+              </a:buClr>
+              <a:buFont typeface="Times" charset="0"/>
+              <a:buChar char="•"/>
+              <a:defRPr sz="1400">
+                <a:solidFill>
+                  <a:schemeClr val="tx1"/>
+                </a:solidFill>
+                <a:latin typeface="+mn-lt"/>
+                <a:ea typeface="ＭＳ Ｐゴシック" charset="-128"/>
+              </a:defRPr>
+            </a:lvl4pPr>
+            <a:lvl5pPr marL="1719263" indent="-190500" algn="l" rtl="0" eaLnBrk="0" fontAlgn="base" hangingPunct="0">
+              <a:lnSpc>
+                <a:spcPts val="2500"/>
+              </a:lnSpc>
+              <a:spcBef>
+                <a:spcPct val="0"/>
+              </a:spcBef>
+              <a:spcAft>
+                <a:spcPct val="0"/>
+              </a:spcAft>
+              <a:buClr>
+                <a:schemeClr val="bg2"/>
+              </a:buClr>
+              <a:buFont typeface="Times" charset="0"/>
+              <a:buChar char="•"/>
+              <a:defRPr sz="1200">
+                <a:solidFill>
+                  <a:schemeClr val="tx1"/>
+                </a:solidFill>
+                <a:latin typeface="+mn-lt"/>
+                <a:ea typeface="ＭＳ Ｐゴシック" charset="-128"/>
+              </a:defRPr>
+            </a:lvl5pPr>
+            <a:lvl6pPr marL="2176463" indent="-190500" algn="l" rtl="0" eaLnBrk="0" fontAlgn="base" hangingPunct="0">
+              <a:lnSpc>
+                <a:spcPts val="2500"/>
+              </a:lnSpc>
+              <a:spcBef>
+                <a:spcPct val="0"/>
+              </a:spcBef>
+              <a:spcAft>
+                <a:spcPct val="0"/>
+              </a:spcAft>
+              <a:buClr>
+                <a:schemeClr val="bg2"/>
+              </a:buClr>
+              <a:buFont typeface="Times" pitchFamily="18" charset="0"/>
+              <a:buChar char="•"/>
+              <a:defRPr sz="1200">
+                <a:solidFill>
+                  <a:schemeClr val="tx1"/>
+                </a:solidFill>
+                <a:latin typeface="+mn-lt"/>
+              </a:defRPr>
+            </a:lvl6pPr>
+            <a:lvl7pPr marL="2633663" indent="-190500" algn="l" rtl="0" eaLnBrk="0" fontAlgn="base" hangingPunct="0">
+              <a:lnSpc>
+                <a:spcPts val="2500"/>
+              </a:lnSpc>
+              <a:spcBef>
+                <a:spcPct val="0"/>
+              </a:spcBef>
+              <a:spcAft>
+                <a:spcPct val="0"/>
+              </a:spcAft>
+              <a:buClr>
+                <a:schemeClr val="bg2"/>
+              </a:buClr>
+              <a:buFont typeface="Times" pitchFamily="18" charset="0"/>
+              <a:buChar char="•"/>
+              <a:defRPr sz="1200">
+                <a:solidFill>
+                  <a:schemeClr val="tx1"/>
+                </a:solidFill>
+                <a:latin typeface="+mn-lt"/>
+              </a:defRPr>
+            </a:lvl7pPr>
+            <a:lvl8pPr marL="3090863" indent="-190500" algn="l" rtl="0" eaLnBrk="0" fontAlgn="base" hangingPunct="0">
+              <a:lnSpc>
+                <a:spcPts val="2500"/>
+              </a:lnSpc>
+              <a:spcBef>
+                <a:spcPct val="0"/>
+              </a:spcBef>
+              <a:spcAft>
+                <a:spcPct val="0"/>
+              </a:spcAft>
+              <a:buClr>
+                <a:schemeClr val="bg2"/>
+              </a:buClr>
+              <a:buFont typeface="Times" pitchFamily="18" charset="0"/>
+              <a:buChar char="•"/>
+              <a:defRPr sz="1200">
+                <a:solidFill>
+                  <a:schemeClr val="tx1"/>
+                </a:solidFill>
+                <a:latin typeface="+mn-lt"/>
+              </a:defRPr>
+            </a:lvl8pPr>
+            <a:lvl9pPr marL="3548063" indent="-190500" algn="l" rtl="0" eaLnBrk="0" fontAlgn="base" hangingPunct="0">
+              <a:lnSpc>
+                <a:spcPts val="2500"/>
+              </a:lnSpc>
+              <a:spcBef>
+                <a:spcPct val="0"/>
+              </a:spcBef>
+              <a:spcAft>
+                <a:spcPct val="0"/>
+              </a:spcAft>
+              <a:buClr>
+                <a:schemeClr val="bg2"/>
+              </a:buClr>
+              <a:buFont typeface="Times" pitchFamily="18" charset="0"/>
+              <a:buChar char="•"/>
+              <a:defRPr sz="1200">
+                <a:solidFill>
+                  <a:schemeClr val="tx1"/>
+                </a:solidFill>
+                <a:latin typeface="+mn-lt"/>
+              </a:defRPr>
+            </a:lvl9pPr>
+          </a:lstStyle>
+          <a:p>
+            <a:pPr marL="0" indent="0" algn="r">
+              <a:buNone/>
+            </a:pPr>
+            <a:r>
+              <a:rPr lang="nl-NL" sz="1800" dirty="0" smtClean="0"/>
+              <a:t>Final presentation – group B2</a:t>
+            </a:r>
+          </a:p>
+          <a:p>
+            <a:pPr marL="0" indent="0" algn="r">
+              <a:buNone/>
+            </a:pPr>
+            <a:r>
+              <a:rPr lang="nl-NL" sz="1800" dirty="0" smtClean="0"/>
+              <a:t>Julio Ballesteros, Sjoerd Bosma, Wessel Bruinsma, Robin Hes</a:t>
+            </a:r>
+          </a:p>
+          <a:p>
+            <a:pPr marL="0" indent="0" algn="r">
+              <a:buNone/>
+            </a:pPr>
+            <a:r>
+              <a:rPr lang="en-US" sz="1800" dirty="0">
+                <a:solidFill>
+                  <a:srgbClr val="000000"/>
+                </a:solidFill>
               </a:rPr>
               <a:t>20-6-2014</a:t>
             </a:r>
-            <a:endParaRPr lang="en-US" dirty="0" smtClean="0">
-              <a:solidFill>
-                <a:schemeClr val="bg1"/>
-              </a:solidFill>
-              <a:latin typeface="+mn-lt"/>
-            </a:endParaRPr>
-          </a:p>
-        </p:txBody>
-      </p:sp>
-      <p:sp>
-        <p:nvSpPr>
-          <p:cNvPr id="7" name="Rectangle 20"/>
-          <p:cNvSpPr>
-            <a:spLocks noChangeArrowheads="1"/>
-          </p:cNvSpPr>
-          <p:nvPr/>
-        </p:nvSpPr>
-        <p:spPr bwMode="auto">
-          <a:xfrm>
-            <a:off x="0" y="0"/>
-            <a:ext cx="469900" cy="2057400"/>
-          </a:xfrm>
-          <a:prstGeom prst="rect">
-            <a:avLst/>
-          </a:prstGeom>
-          <a:solidFill>
-            <a:srgbClr val="00A6D6"/>
-          </a:solidFill>
-          <a:ln w="9525">
-            <a:noFill/>
-            <a:miter lim="800000"/>
-            <a:headEnd/>
-            <a:tailEnd/>
-          </a:ln>
-          <a:effectLst/>
-        </p:spPr>
-        <p:txBody>
-          <a:bodyPr wrap="none" anchor="ctr"/>
-          <a:lstStyle/>
-          <a:p>
-            <a:pPr algn="r">
-              <a:defRPr/>
+          </a:p>
+          <a:p>
+            <a:pPr marL="0" indent="0" algn="r">
+              <a:buNone/>
             </a:pPr>
-            <a:endParaRPr lang="nl-NL" sz="2200">
-              <a:latin typeface="Tahoma" pitchFamily="34" charset="0"/>
-              <a:cs typeface="+mn-cs"/>
-            </a:endParaRPr>
+            <a:endParaRPr lang="nl-NL" sz="1800" dirty="0" smtClean="0"/>
           </a:p>
         </p:txBody>
       </p:sp>
     </p:spTree>
+    <p:extLst>
+      <p:ext uri="{BB962C8B-B14F-4D97-AF65-F5344CB8AC3E}">
+        <p14:creationId xmlns:p14="http://schemas.microsoft.com/office/powerpoint/2010/main" val="4067279051"/>
+      </p:ext>
+    </p:extLst>
   </p:cSld>
   <p:clrMapOvr>
     <a:masterClrMapping/>
@@ -4230,7 +4716,7 @@
   <p:timing>
     <p:tnLst>
       <p:par>
-        <p:cTn id="1" dur="indefinite" restart="never" nodeType="tmRoot"/>
+        <p:cTn xmlns:p14="http://schemas.microsoft.com/office/powerpoint/2010/main" id="1" dur="indefinite" restart="never" nodeType="tmRoot"/>
       </p:par>
     </p:tnLst>
   </p:timing>
@@ -4348,13 +4834,20 @@
     </p:spTree>
     <p:extLst>
       <p:ext uri="{BB962C8B-B14F-4D97-AF65-F5344CB8AC3E}">
-        <p14:creationId xmlns:p14="http://schemas.microsoft.com/office/powerpoint/2010/main" val="4067279051"/>
+        <p14:creationId xmlns:p14="http://schemas.microsoft.com/office/powerpoint/2010/main" val="2836365973"/>
       </p:ext>
     </p:extLst>
   </p:cSld>
   <p:clrMapOvr>
     <a:masterClrMapping/>
   </p:clrMapOvr>
+  <p:timing>
+    <p:tnLst>
+      <p:par>
+        <p:cTn xmlns:p14="http://schemas.microsoft.com/office/powerpoint/2010/main" id="1" dur="indefinite" restart="never" nodeType="tmRoot"/>
+      </p:par>
+    </p:tnLst>
+  </p:timing>
 </p:sld>
 </file>
 
@@ -4391,12 +4884,8 @@
           <a:lstStyle/>
           <a:p>
             <a:r>
-              <a:rPr lang="nl-NL" dirty="0" err="1" smtClean="0"/>
-              <a:t>Final</a:t>
-            </a:r>
-            <a:r>
               <a:rPr lang="nl-NL" dirty="0" smtClean="0"/>
-              <a:t> </a:t>
+              <a:t>Final </a:t>
             </a:r>
             <a:r>
               <a:rPr lang="nl-NL" dirty="0" err="1" smtClean="0"/>
@@ -4611,6 +5100,13 @@
   <p:clrMapOvr>
     <a:masterClrMapping/>
   </p:clrMapOvr>
+  <p:timing>
+    <p:tnLst>
+      <p:par>
+        <p:cTn xmlns:p14="http://schemas.microsoft.com/office/powerpoint/2010/main" id="1" dur="indefinite" restart="never" nodeType="tmRoot"/>
+      </p:par>
+    </p:tnLst>
+  </p:timing>
 </p:sld>
 </file>
 

</xml_diff>

<commit_message>
final version final presentation
</commit_message>
<xml_diff>
--- a/docs/final-presentation/final-presentation.pptx
+++ b/docs/final-presentation/final-presentation.pptx
@@ -5,15 +5,23 @@
     <p:sldMasterId id="2147483649" r:id="rId1"/>
   </p:sldMasterIdLst>
   <p:notesMasterIdLst>
-    <p:notesMasterId r:id="rId5"/>
+    <p:notesMasterId r:id="rId13"/>
   </p:notesMasterIdLst>
   <p:handoutMasterIdLst>
-    <p:handoutMasterId r:id="rId6"/>
+    <p:handoutMasterId r:id="rId14"/>
   </p:handoutMasterIdLst>
   <p:sldIdLst>
     <p:sldId id="378" r:id="rId2"/>
     <p:sldId id="380" r:id="rId3"/>
-    <p:sldId id="379" r:id="rId4"/>
+    <p:sldId id="381" r:id="rId4"/>
+    <p:sldId id="382" r:id="rId5"/>
+    <p:sldId id="383" r:id="rId6"/>
+    <p:sldId id="384" r:id="rId7"/>
+    <p:sldId id="385" r:id="rId8"/>
+    <p:sldId id="386" r:id="rId9"/>
+    <p:sldId id="388" r:id="rId10"/>
+    <p:sldId id="387" r:id="rId11"/>
+    <p:sldId id="379" r:id="rId12"/>
   </p:sldIdLst>
   <p:sldSz cx="9144000" cy="6858000" type="screen4x3"/>
   <p:notesSz cx="6794500" cy="9931400"/>
@@ -264,7 +272,7 @@
             <a:fld id="{D3646748-BC25-41CA-A659-7F968DC11A47}" type="datetime1">
               <a:rPr lang="en-US"/>
               <a:pPr/>
-              <a:t>16/06/14</a:t>
+              <a:t>6/17/2014</a:t>
             </a:fld>
             <a:endParaRPr lang="en-US"/>
           </a:p>
@@ -364,7 +372,7 @@
             <a:fld id="{B52C0C59-AA4C-4078-A3BC-7C507C177C2D}" type="slidenum">
               <a:rPr lang="en-US"/>
               <a:pPr/>
-              <a:t>‹#›</a:t>
+              <a:t>‹nr.›</a:t>
             </a:fld>
             <a:endParaRPr lang="en-US"/>
           </a:p>
@@ -532,7 +540,7 @@
             <a:tailEnd/>
           </a:ln>
           <a:extLst>
-            <a:ext uri="{909E8E84-426E-40dd-AFC4-6F175D3DCCD1}">
+            <a:ext uri="{909E8E84-426E-40DD-AFC4-6F175D3DCCD1}">
               <a14:hiddenFill xmlns:a14="http://schemas.microsoft.com/office/drawing/2010/main">
                 <a:solidFill>
                   <a:srgbClr val="FFFFFF"/>
@@ -705,7 +713,7 @@
             <a:fld id="{BCFF86D8-912B-44CC-9616-552AE1A16EB1}" type="slidenum">
               <a:rPr lang="en-US"/>
               <a:pPr/>
-              <a:t>‹#›</a:t>
+              <a:t>‹nr.›</a:t>
             </a:fld>
             <a:endParaRPr lang="en-US"/>
           </a:p>
@@ -844,6 +852,91 @@
 </p:notesMaster>
 </file>
 
+<file path=ppt/notesSlides/notesSlide1.xml><?xml version="1.0" encoding="utf-8"?>
+<p:notes xmlns:a="http://schemas.openxmlformats.org/drawingml/2006/main" xmlns:r="http://schemas.openxmlformats.org/officeDocument/2006/relationships" xmlns:p="http://schemas.openxmlformats.org/presentationml/2006/main">
+  <p:cSld>
+    <p:spTree>
+      <p:nvGrpSpPr>
+        <p:cNvPr id="1" name=""/>
+        <p:cNvGrpSpPr/>
+        <p:nvPr/>
+      </p:nvGrpSpPr>
+      <p:grpSpPr>
+        <a:xfrm>
+          <a:off x="0" y="0"/>
+          <a:ext cx="0" cy="0"/>
+          <a:chOff x="0" y="0"/>
+          <a:chExt cx="0" cy="0"/>
+        </a:xfrm>
+      </p:grpSpPr>
+      <p:sp>
+        <p:nvSpPr>
+          <p:cNvPr id="2" name="Tijdelijke aanduiding voor dia-afbeelding 1"/>
+          <p:cNvSpPr>
+            <a:spLocks noGrp="1" noRot="1" noChangeAspect="1"/>
+          </p:cNvSpPr>
+          <p:nvPr>
+            <p:ph type="sldImg"/>
+          </p:nvPr>
+        </p:nvSpPr>
+        <p:spPr/>
+      </p:sp>
+      <p:sp>
+        <p:nvSpPr>
+          <p:cNvPr id="3" name="Tijdelijke aanduiding voor notities 2"/>
+          <p:cNvSpPr>
+            <a:spLocks noGrp="1"/>
+          </p:cNvSpPr>
+          <p:nvPr>
+            <p:ph type="body" idx="1"/>
+          </p:nvPr>
+        </p:nvSpPr>
+        <p:spPr/>
+        <p:txBody>
+          <a:bodyPr/>
+          <a:lstStyle/>
+          <a:p>
+            <a:endParaRPr lang="nl-NL" dirty="0"/>
+          </a:p>
+        </p:txBody>
+      </p:sp>
+      <p:sp>
+        <p:nvSpPr>
+          <p:cNvPr id="4" name="Tijdelijke aanduiding voor dianummer 3"/>
+          <p:cNvSpPr>
+            <a:spLocks noGrp="1"/>
+          </p:cNvSpPr>
+          <p:nvPr>
+            <p:ph type="sldNum" sz="quarter" idx="10"/>
+          </p:nvPr>
+        </p:nvSpPr>
+        <p:spPr/>
+        <p:txBody>
+          <a:bodyPr/>
+          <a:lstStyle/>
+          <a:p>
+            <a:fld id="{BCFF86D8-912B-44CC-9616-552AE1A16EB1}" type="slidenum">
+              <a:rPr lang="en-US" smtClean="0"/>
+              <a:pPr/>
+              <a:t>1</a:t>
+            </a:fld>
+            <a:endParaRPr lang="en-US"/>
+          </a:p>
+        </p:txBody>
+      </p:sp>
+    </p:spTree>
+    <p:extLst>
+      <p:ext uri="{BB962C8B-B14F-4D97-AF65-F5344CB8AC3E}">
+        <p14:creationId xmlns:p14="http://schemas.microsoft.com/office/powerpoint/2010/main" val="2093758392"/>
+      </p:ext>
+    </p:extLst>
+  </p:cSld>
+  <p:clrMapOvr>
+    <a:masterClrMapping/>
+  </p:clrMapOvr>
+</p:notes>
+</file>
+
 <file path=ppt/slideLayouts/slideLayout1.xml><?xml version="1.0" encoding="utf-8"?>
 <p:sldLayout xmlns:a="http://schemas.openxmlformats.org/drawingml/2006/main" xmlns:r="http://schemas.openxmlformats.org/officeDocument/2006/relationships" xmlns:p="http://schemas.openxmlformats.org/presentationml/2006/main" type="title" preserve="1">
   <p:cSld name="1_Titeldia">
@@ -2994,14 +3087,14 @@
             <a:noFill/>
           </a:ln>
           <a:extLst>
-            <a:ext uri="{909E8E84-426E-40dd-AFC4-6F175D3DCCD1}">
+            <a:ext uri="{909E8E84-426E-40DD-AFC4-6F175D3DCCD1}">
               <a14:hiddenFill xmlns:a14="http://schemas.microsoft.com/office/drawing/2010/main">
                 <a:solidFill>
                   <a:srgbClr val="FFFFFF"/>
                 </a:solidFill>
               </a14:hiddenFill>
             </a:ext>
-            <a:ext uri="{91240B29-F687-4f45-9708-019B960494DF}">
+            <a:ext uri="{91240B29-F687-4F45-9708-019B960494DF}">
               <a14:hiddenLine xmlns:a14="http://schemas.microsoft.com/office/drawing/2010/main" w="9525">
                 <a:solidFill>
                   <a:srgbClr val="000000"/>
@@ -3056,14 +3149,14 @@
             <a:noFill/>
           </a:ln>
           <a:extLst>
-            <a:ext uri="{909E8E84-426E-40dd-AFC4-6F175D3DCCD1}">
+            <a:ext uri="{909E8E84-426E-40DD-AFC4-6F175D3DCCD1}">
               <a14:hiddenFill xmlns:a14="http://schemas.microsoft.com/office/drawing/2010/main">
                 <a:solidFill>
                   <a:srgbClr val="FFFFFF"/>
                 </a:solidFill>
               </a14:hiddenFill>
             </a:ext>
-            <a:ext uri="{91240B29-F687-4f45-9708-019B960494DF}">
+            <a:ext uri="{91240B29-F687-4F45-9708-019B960494DF}">
               <a14:hiddenLine xmlns:a14="http://schemas.microsoft.com/office/drawing/2010/main" w="9525">
                 <a:solidFill>
                   <a:srgbClr val="000000"/>
@@ -3391,14 +3484,14 @@
             <a:noFill/>
           </a:ln>
           <a:extLst>
-            <a:ext uri="{909E8E84-426E-40dd-AFC4-6F175D3DCCD1}">
+            <a:ext uri="{909E8E84-426E-40DD-AFC4-6F175D3DCCD1}">
               <a14:hiddenFill xmlns:a14="http://schemas.microsoft.com/office/drawing/2010/main">
                 <a:solidFill>
                   <a:srgbClr val="FFFFFF"/>
                 </a:solidFill>
               </a14:hiddenFill>
             </a:ext>
-            <a:ext uri="{91240B29-F687-4f45-9708-019B960494DF}">
+            <a:ext uri="{91240B29-F687-4F45-9708-019B960494DF}">
               <a14:hiddenLine xmlns:a14="http://schemas.microsoft.com/office/drawing/2010/main" w="9525">
                 <a:solidFill>
                   <a:srgbClr val="000000"/>
@@ -3446,7 +3539,7 @@
                 <a:ea typeface="ＭＳ Ｐゴシック" charset="-128"/>
               </a:rPr>
               <a:pPr algn="r"/>
-              <a:t>‹#›</a:t>
+              <a:t>‹nr.›</a:t>
             </a:fld>
             <a:endParaRPr lang="nl-NL" sz="1100">
               <a:ea typeface="ＭＳ Ｐゴシック" charset="-128"/>
@@ -3512,7 +3605,7 @@
   <p:timing>
     <p:tnLst>
       <p:par>
-        <p:cTn xmlns:p14="http://schemas.microsoft.com/office/powerpoint/2010/main" id="1" dur="indefinite" restart="never" nodeType="tmRoot"/>
+        <p:cTn id="1" dur="indefinite" restart="never" nodeType="tmRoot"/>
       </p:par>
     </p:tnLst>
   </p:timing>
@@ -3986,7 +4079,7 @@
           <p:nvPr/>
         </p:nvPicPr>
         <p:blipFill>
-          <a:blip r:embed="rId2">
+          <a:blip r:embed="rId3">
             <a:extLst>
               <a:ext uri="{28A0092B-C50C-407E-A947-70E740481C1C}">
                 <a14:useLocalDpi xmlns:a14="http://schemas.microsoft.com/office/drawing/2010/main" val="0"/>
@@ -4016,7 +4109,7 @@
           <p:nvPr/>
         </p:nvPicPr>
         <p:blipFill>
-          <a:blip r:embed="rId3">
+          <a:blip r:embed="rId4">
             <a:extLst>
               <a:ext uri="{28A0092B-C50C-407E-A947-70E740481C1C}">
                 <a14:useLocalDpi xmlns:a14="http://schemas.microsoft.com/office/drawing/2010/main" val="0"/>
@@ -4046,7 +4139,7 @@
           <p:nvPr/>
         </p:nvPicPr>
         <p:blipFill>
-          <a:blip r:embed="rId4">
+          <a:blip r:embed="rId5">
             <a:extLst>
               <a:ext uri="{28A0092B-C50C-407E-A947-70E740481C1C}">
                 <a14:useLocalDpi xmlns:a14="http://schemas.microsoft.com/office/drawing/2010/main" val="0"/>
@@ -4076,7 +4169,7 @@
           <p:nvPr/>
         </p:nvPicPr>
         <p:blipFill>
-          <a:blip r:embed="rId5">
+          <a:blip r:embed="rId6">
             <a:extLst>
               <a:ext uri="{28A0092B-C50C-407E-A947-70E740481C1C}">
                 <a14:useLocalDpi xmlns:a14="http://schemas.microsoft.com/office/drawing/2010/main" val="0"/>
@@ -4170,7 +4263,7 @@
           <p:nvPr/>
         </p:nvPicPr>
         <p:blipFill>
-          <a:blip r:embed="rId6">
+          <a:blip r:embed="rId7">
             <a:extLst>
               <a:ext uri="{28A0092B-C50C-407E-A947-70E740481C1C}">
                 <a14:useLocalDpi xmlns:a14="http://schemas.microsoft.com/office/drawing/2010/main" val="0"/>
@@ -4392,7 +4485,7 @@
           <p:nvPr/>
         </p:nvPicPr>
         <p:blipFill>
-          <a:blip r:embed="rId7">
+          <a:blip r:embed="rId8">
             <a:extLst>
               <a:ext uri="{28A0092B-C50C-407E-A947-70E740481C1C}">
                 <a14:useLocalDpi xmlns:a14="http://schemas.microsoft.com/office/drawing/2010/main" val="0"/>
@@ -4434,14 +4527,14 @@
             <a:noFill/>
           </a:ln>
           <a:extLst>
-            <a:ext uri="{909E8E84-426E-40dd-AFC4-6F175D3DCCD1}">
+            <a:ext uri="{909E8E84-426E-40DD-AFC4-6F175D3DCCD1}">
               <a14:hiddenFill xmlns:a14="http://schemas.microsoft.com/office/drawing/2010/main">
                 <a:solidFill>
                   <a:srgbClr val="FFFFFF"/>
                 </a:solidFill>
               </a14:hiddenFill>
             </a:ext>
-            <a:ext uri="{91240B29-F687-4f45-9708-019B960494DF}">
+            <a:ext uri="{91240B29-F687-4F45-9708-019B960494DF}">
               <a14:hiddenLine xmlns:a14="http://schemas.microsoft.com/office/drawing/2010/main" w="9525">
                 <a:solidFill>
                   <a:srgbClr val="000000"/>
@@ -4716,7 +4809,549 @@
   <p:timing>
     <p:tnLst>
       <p:par>
-        <p:cTn xmlns:p14="http://schemas.microsoft.com/office/powerpoint/2010/main" id="1" dur="indefinite" restart="never" nodeType="tmRoot"/>
+        <p:cTn id="1" dur="indefinite" restart="never" nodeType="tmRoot"/>
+      </p:par>
+    </p:tnLst>
+  </p:timing>
+</p:sld>
+</file>
+
+<file path=ppt/slides/slide10.xml><?xml version="1.0" encoding="utf-8"?>
+<p:sld xmlns:a="http://schemas.openxmlformats.org/drawingml/2006/main" xmlns:r="http://schemas.openxmlformats.org/officeDocument/2006/relationships" xmlns:p="http://schemas.openxmlformats.org/presentationml/2006/main">
+  <p:cSld>
+    <p:spTree>
+      <p:nvGrpSpPr>
+        <p:cNvPr id="1" name=""/>
+        <p:cNvGrpSpPr/>
+        <p:nvPr/>
+      </p:nvGrpSpPr>
+      <p:grpSpPr>
+        <a:xfrm>
+          <a:off x="0" y="0"/>
+          <a:ext cx="0" cy="0"/>
+          <a:chOff x="0" y="0"/>
+          <a:chExt cx="0" cy="0"/>
+        </a:xfrm>
+      </p:grpSpPr>
+      <p:sp>
+        <p:nvSpPr>
+          <p:cNvPr id="2" name="Title 1"/>
+          <p:cNvSpPr>
+            <a:spLocks noGrp="1"/>
+          </p:cNvSpPr>
+          <p:nvPr>
+            <p:ph type="title"/>
+          </p:nvPr>
+        </p:nvSpPr>
+        <p:spPr/>
+        <p:txBody>
+          <a:bodyPr/>
+          <a:lstStyle/>
+          <a:p>
+            <a:r>
+              <a:rPr lang="en-US" dirty="0" smtClean="0"/>
+              <a:t>System verification</a:t>
+            </a:r>
+            <a:endParaRPr lang="en-US" dirty="0"/>
+          </a:p>
+        </p:txBody>
+      </p:sp>
+      <p:sp>
+        <p:nvSpPr>
+          <p:cNvPr id="6" name="Title 1"/>
+          <p:cNvSpPr txBox="1">
+            <a:spLocks/>
+          </p:cNvSpPr>
+          <p:nvPr/>
+        </p:nvSpPr>
+        <p:spPr bwMode="auto">
+          <a:xfrm>
+            <a:off x="948296" y="1096334"/>
+            <a:ext cx="7159625" cy="470340"/>
+          </a:xfrm>
+          <a:prstGeom prst="rect">
+            <a:avLst/>
+          </a:prstGeom>
+          <a:noFill/>
+          <a:ln>
+            <a:noFill/>
+          </a:ln>
+          <a:extLst>
+            <a:ext uri="{909E8E84-426E-40DD-AFC4-6F175D3DCCD1}">
+              <a14:hiddenFill xmlns:a14="http://schemas.microsoft.com/office/drawing/2010/main">
+                <a:solidFill>
+                  <a:srgbClr val="FFFFFF"/>
+                </a:solidFill>
+              </a14:hiddenFill>
+            </a:ext>
+            <a:ext uri="{91240B29-F687-4F45-9708-019B960494DF}">
+              <a14:hiddenLine xmlns:a14="http://schemas.microsoft.com/office/drawing/2010/main" w="9525">
+                <a:solidFill>
+                  <a:srgbClr val="000000"/>
+                </a:solidFill>
+                <a:miter lim="800000"/>
+                <a:headEnd/>
+                <a:tailEnd/>
+              </a14:hiddenLine>
+            </a:ext>
+          </a:extLst>
+        </p:spPr>
+        <p:txBody>
+          <a:bodyPr vert="horz" wrap="square" lIns="0" tIns="0" rIns="0" bIns="0" numCol="1" anchor="t" anchorCtr="0" compatLnSpc="1">
+            <a:prstTxWarp prst="textNoShape">
+              <a:avLst/>
+            </a:prstTxWarp>
+          </a:bodyPr>
+          <a:lstStyle>
+            <a:lvl1pPr marL="857250" indent="-857250" algn="l" rtl="0" eaLnBrk="0" fontAlgn="base" hangingPunct="0">
+              <a:spcBef>
+                <a:spcPct val="0"/>
+              </a:spcBef>
+              <a:spcAft>
+                <a:spcPct val="0"/>
+              </a:spcAft>
+              <a:defRPr sz="3300">
+                <a:solidFill>
+                  <a:schemeClr val="tx1"/>
+                </a:solidFill>
+                <a:latin typeface="+mj-lt"/>
+                <a:ea typeface="ＭＳ Ｐゴシック" charset="-128"/>
+                <a:cs typeface="ＭＳ Ｐゴシック" charset="-128"/>
+              </a:defRPr>
+            </a:lvl1pPr>
+            <a:lvl2pPr marL="857250" indent="-857250" algn="l" rtl="0" eaLnBrk="0" fontAlgn="base" hangingPunct="0">
+              <a:spcBef>
+                <a:spcPct val="0"/>
+              </a:spcBef>
+              <a:spcAft>
+                <a:spcPct val="0"/>
+              </a:spcAft>
+              <a:defRPr sz="3300">
+                <a:solidFill>
+                  <a:schemeClr val="tx1"/>
+                </a:solidFill>
+                <a:latin typeface="Bookman Old Style" pitchFamily="18" charset="0"/>
+                <a:ea typeface="ＭＳ Ｐゴシック" charset="-128"/>
+                <a:cs typeface="ＭＳ Ｐゴシック" charset="-128"/>
+              </a:defRPr>
+            </a:lvl2pPr>
+            <a:lvl3pPr marL="857250" indent="-857250" algn="l" rtl="0" eaLnBrk="0" fontAlgn="base" hangingPunct="0">
+              <a:spcBef>
+                <a:spcPct val="0"/>
+              </a:spcBef>
+              <a:spcAft>
+                <a:spcPct val="0"/>
+              </a:spcAft>
+              <a:defRPr sz="3300">
+                <a:solidFill>
+                  <a:schemeClr val="tx1"/>
+                </a:solidFill>
+                <a:latin typeface="Bookman Old Style" pitchFamily="18" charset="0"/>
+                <a:ea typeface="ＭＳ Ｐゴシック" charset="-128"/>
+                <a:cs typeface="ＭＳ Ｐゴシック" charset="-128"/>
+              </a:defRPr>
+            </a:lvl3pPr>
+            <a:lvl4pPr marL="857250" indent="-857250" algn="l" rtl="0" eaLnBrk="0" fontAlgn="base" hangingPunct="0">
+              <a:spcBef>
+                <a:spcPct val="0"/>
+              </a:spcBef>
+              <a:spcAft>
+                <a:spcPct val="0"/>
+              </a:spcAft>
+              <a:defRPr sz="3300">
+                <a:solidFill>
+                  <a:schemeClr val="tx1"/>
+                </a:solidFill>
+                <a:latin typeface="Bookman Old Style" pitchFamily="18" charset="0"/>
+                <a:ea typeface="ＭＳ Ｐゴシック" charset="-128"/>
+                <a:cs typeface="ＭＳ Ｐゴシック" charset="-128"/>
+              </a:defRPr>
+            </a:lvl4pPr>
+            <a:lvl5pPr marL="857250" indent="-857250" algn="l" rtl="0" eaLnBrk="0" fontAlgn="base" hangingPunct="0">
+              <a:spcBef>
+                <a:spcPct val="0"/>
+              </a:spcBef>
+              <a:spcAft>
+                <a:spcPct val="0"/>
+              </a:spcAft>
+              <a:defRPr sz="3300">
+                <a:solidFill>
+                  <a:schemeClr val="tx1"/>
+                </a:solidFill>
+                <a:latin typeface="Bookman Old Style" pitchFamily="18" charset="0"/>
+                <a:ea typeface="ＭＳ Ｐゴシック" charset="-128"/>
+                <a:cs typeface="ＭＳ Ｐゴシック" charset="-128"/>
+              </a:defRPr>
+            </a:lvl5pPr>
+            <a:lvl6pPr marL="1314450" indent="-857250" algn="l" rtl="0" eaLnBrk="0" fontAlgn="base" hangingPunct="0">
+              <a:spcBef>
+                <a:spcPct val="0"/>
+              </a:spcBef>
+              <a:spcAft>
+                <a:spcPct val="0"/>
+              </a:spcAft>
+              <a:defRPr sz="3300">
+                <a:solidFill>
+                  <a:schemeClr val="tx1"/>
+                </a:solidFill>
+                <a:latin typeface="Bookman Old Style" pitchFamily="18" charset="0"/>
+              </a:defRPr>
+            </a:lvl6pPr>
+            <a:lvl7pPr marL="1771650" indent="-857250" algn="l" rtl="0" eaLnBrk="0" fontAlgn="base" hangingPunct="0">
+              <a:spcBef>
+                <a:spcPct val="0"/>
+              </a:spcBef>
+              <a:spcAft>
+                <a:spcPct val="0"/>
+              </a:spcAft>
+              <a:defRPr sz="3300">
+                <a:solidFill>
+                  <a:schemeClr val="tx1"/>
+                </a:solidFill>
+                <a:latin typeface="Bookman Old Style" pitchFamily="18" charset="0"/>
+              </a:defRPr>
+            </a:lvl7pPr>
+            <a:lvl8pPr marL="2228850" indent="-857250" algn="l" rtl="0" eaLnBrk="0" fontAlgn="base" hangingPunct="0">
+              <a:spcBef>
+                <a:spcPct val="0"/>
+              </a:spcBef>
+              <a:spcAft>
+                <a:spcPct val="0"/>
+              </a:spcAft>
+              <a:defRPr sz="3300">
+                <a:solidFill>
+                  <a:schemeClr val="tx1"/>
+                </a:solidFill>
+                <a:latin typeface="Bookman Old Style" pitchFamily="18" charset="0"/>
+              </a:defRPr>
+            </a:lvl8pPr>
+            <a:lvl9pPr marL="2686050" indent="-857250" algn="l" rtl="0" eaLnBrk="0" fontAlgn="base" hangingPunct="0">
+              <a:spcBef>
+                <a:spcPct val="0"/>
+              </a:spcBef>
+              <a:spcAft>
+                <a:spcPct val="0"/>
+              </a:spcAft>
+              <a:defRPr sz="3300">
+                <a:solidFill>
+                  <a:schemeClr val="tx1"/>
+                </a:solidFill>
+                <a:latin typeface="Bookman Old Style" pitchFamily="18" charset="0"/>
+              </a:defRPr>
+            </a:lvl9pPr>
+          </a:lstStyle>
+          <a:p>
+            <a:r>
+              <a:rPr lang="en-US" sz="2000" dirty="0" smtClean="0"/>
+              <a:t>Our approach</a:t>
+            </a:r>
+            <a:endParaRPr lang="en-US" sz="2000" dirty="0"/>
+          </a:p>
+        </p:txBody>
+      </p:sp>
+      <p:pic>
+        <p:nvPicPr>
+          <p:cNvPr id="3" name="Picture 2" descr="Screen Shot 2014-06-17 at 00.17.05.png"/>
+          <p:cNvPicPr>
+            <a:picLocks noChangeAspect="1"/>
+          </p:cNvPicPr>
+          <p:nvPr/>
+        </p:nvPicPr>
+        <p:blipFill>
+          <a:blip r:embed="rId2">
+            <a:extLst>
+              <a:ext uri="{28A0092B-C50C-407E-A947-70E740481C1C}">
+                <a14:useLocalDpi xmlns:a14="http://schemas.microsoft.com/office/drawing/2010/main" val="0"/>
+              </a:ext>
+            </a:extLst>
+          </a:blip>
+          <a:stretch>
+            <a:fillRect/>
+          </a:stretch>
+        </p:blipFill>
+        <p:spPr>
+          <a:xfrm>
+            <a:off x="1873682" y="1478139"/>
+            <a:ext cx="5066785" cy="4478266"/>
+          </a:xfrm>
+          <a:prstGeom prst="rect">
+            <a:avLst/>
+          </a:prstGeom>
+        </p:spPr>
+      </p:pic>
+    </p:spTree>
+    <p:extLst>
+      <p:ext uri="{BB962C8B-B14F-4D97-AF65-F5344CB8AC3E}">
+        <p14:creationId xmlns:p14="http://schemas.microsoft.com/office/powerpoint/2010/main" val="2669856762"/>
+      </p:ext>
+    </p:extLst>
+  </p:cSld>
+  <p:clrMapOvr>
+    <a:masterClrMapping/>
+  </p:clrMapOvr>
+  <p:timing>
+    <p:tnLst>
+      <p:par>
+        <p:cTn id="1" dur="indefinite" restart="never" nodeType="tmRoot"/>
+      </p:par>
+    </p:tnLst>
+  </p:timing>
+</p:sld>
+</file>
+
+<file path=ppt/slides/slide11.xml><?xml version="1.0" encoding="utf-8"?>
+<p:sld xmlns:a="http://schemas.openxmlformats.org/drawingml/2006/main" xmlns:r="http://schemas.openxmlformats.org/officeDocument/2006/relationships" xmlns:p="http://schemas.openxmlformats.org/presentationml/2006/main">
+  <p:cSld>
+    <p:spTree>
+      <p:nvGrpSpPr>
+        <p:cNvPr id="1" name=""/>
+        <p:cNvGrpSpPr/>
+        <p:nvPr/>
+      </p:nvGrpSpPr>
+      <p:grpSpPr>
+        <a:xfrm>
+          <a:off x="0" y="0"/>
+          <a:ext cx="0" cy="0"/>
+          <a:chOff x="0" y="0"/>
+          <a:chExt cx="0" cy="0"/>
+        </a:xfrm>
+      </p:grpSpPr>
+      <p:sp>
+        <p:nvSpPr>
+          <p:cNvPr id="2" name="Titel 1"/>
+          <p:cNvSpPr>
+            <a:spLocks noGrp="1"/>
+          </p:cNvSpPr>
+          <p:nvPr>
+            <p:ph type="title"/>
+          </p:nvPr>
+        </p:nvSpPr>
+        <p:spPr/>
+        <p:txBody>
+          <a:bodyPr/>
+          <a:lstStyle/>
+          <a:p>
+            <a:r>
+              <a:rPr lang="nl-NL" dirty="0" smtClean="0"/>
+              <a:t>Final </a:t>
+            </a:r>
+            <a:r>
+              <a:rPr lang="nl-NL" dirty="0" err="1" smtClean="0"/>
+              <a:t>thoughts</a:t>
+            </a:r>
+            <a:endParaRPr lang="nl-NL" dirty="0"/>
+          </a:p>
+        </p:txBody>
+      </p:sp>
+      <p:sp>
+        <p:nvSpPr>
+          <p:cNvPr id="3" name="Tijdelijke aanduiding voor inhoud 2"/>
+          <p:cNvSpPr>
+            <a:spLocks noGrp="1"/>
+          </p:cNvSpPr>
+          <p:nvPr>
+            <p:ph idx="1"/>
+          </p:nvPr>
+        </p:nvSpPr>
+        <p:spPr/>
+        <p:txBody>
+          <a:bodyPr/>
+          <a:lstStyle/>
+          <a:p>
+            <a:pPr>
+              <a:lnSpc>
+                <a:spcPct val="150000"/>
+              </a:lnSpc>
+            </a:pPr>
+            <a:r>
+              <a:rPr lang="nl-NL" dirty="0" err="1" smtClean="0"/>
+              <a:t>Working</a:t>
+            </a:r>
+            <a:r>
+              <a:rPr lang="nl-NL" dirty="0" smtClean="0"/>
+              <a:t> prototype (up </a:t>
+            </a:r>
+            <a:r>
+              <a:rPr lang="nl-NL" dirty="0" err="1" smtClean="0"/>
+              <a:t>to</a:t>
+            </a:r>
+            <a:r>
+              <a:rPr lang="nl-NL" dirty="0" smtClean="0"/>
+              <a:t> </a:t>
+            </a:r>
+            <a:r>
+              <a:rPr lang="nl-NL" dirty="0" err="1" smtClean="0"/>
+              <a:t>challenge</a:t>
+            </a:r>
+            <a:r>
+              <a:rPr lang="nl-NL" dirty="0" smtClean="0"/>
+              <a:t> 2, </a:t>
+            </a:r>
+            <a:r>
+              <a:rPr lang="nl-NL" dirty="0" err="1" smtClean="0"/>
+              <a:t>for</a:t>
+            </a:r>
+            <a:r>
+              <a:rPr lang="nl-NL" dirty="0" smtClean="0"/>
+              <a:t> </a:t>
+            </a:r>
+            <a:r>
+              <a:rPr lang="nl-NL" dirty="0" err="1" smtClean="0"/>
+              <a:t>lack</a:t>
+            </a:r>
+            <a:r>
+              <a:rPr lang="nl-NL" dirty="0" smtClean="0"/>
+              <a:t> of more </a:t>
+            </a:r>
+            <a:r>
+              <a:rPr lang="nl-NL" dirty="0" err="1" smtClean="0"/>
+              <a:t>testing</a:t>
+            </a:r>
+            <a:r>
+              <a:rPr lang="nl-NL" dirty="0" smtClean="0"/>
+              <a:t>)</a:t>
+            </a:r>
+            <a:br>
+              <a:rPr lang="nl-NL" dirty="0" smtClean="0"/>
+            </a:br>
+            <a:endParaRPr lang="nl-NL" dirty="0" smtClean="0"/>
+          </a:p>
+          <a:p>
+            <a:pPr>
+              <a:lnSpc>
+                <a:spcPct val="150000"/>
+              </a:lnSpc>
+            </a:pPr>
+            <a:r>
+              <a:rPr lang="nl-NL" dirty="0" smtClean="0"/>
+              <a:t>TODO:</a:t>
+            </a:r>
+          </a:p>
+          <a:p>
+            <a:pPr lvl="1">
+              <a:lnSpc>
+                <a:spcPct val="150000"/>
+              </a:lnSpc>
+            </a:pPr>
+            <a:r>
+              <a:rPr lang="nl-NL" dirty="0" smtClean="0"/>
+              <a:t>Fix ASIO lag</a:t>
+            </a:r>
+          </a:p>
+          <a:p>
+            <a:pPr lvl="1">
+              <a:lnSpc>
+                <a:spcPct val="150000"/>
+              </a:lnSpc>
+            </a:pPr>
+            <a:r>
+              <a:rPr lang="nl-NL" dirty="0" smtClean="0"/>
+              <a:t>Small </a:t>
+            </a:r>
+            <a:r>
+              <a:rPr lang="nl-NL" dirty="0" err="1" smtClean="0"/>
+              <a:t>improvements</a:t>
+            </a:r>
+            <a:r>
+              <a:rPr lang="nl-NL" dirty="0" smtClean="0"/>
+              <a:t> </a:t>
+            </a:r>
+            <a:r>
+              <a:rPr lang="nl-NL" dirty="0" err="1" smtClean="0"/>
+              <a:t>to</a:t>
+            </a:r>
+            <a:r>
+              <a:rPr lang="nl-NL" dirty="0" smtClean="0"/>
+              <a:t> </a:t>
+            </a:r>
+            <a:r>
+              <a:rPr lang="nl-NL" dirty="0" err="1" smtClean="0"/>
+              <a:t>obstacle</a:t>
+            </a:r>
+            <a:r>
+              <a:rPr lang="nl-NL" dirty="0" smtClean="0"/>
+              <a:t> </a:t>
+            </a:r>
+            <a:r>
+              <a:rPr lang="nl-NL" dirty="0" err="1" smtClean="0"/>
+              <a:t>detection</a:t>
+            </a:r>
+            <a:r>
+              <a:rPr lang="nl-NL" dirty="0" smtClean="0"/>
+              <a:t> </a:t>
+            </a:r>
+            <a:r>
+              <a:rPr lang="nl-NL" dirty="0" err="1" smtClean="0"/>
+              <a:t>using</a:t>
+            </a:r>
+            <a:r>
+              <a:rPr lang="nl-NL" dirty="0" smtClean="0"/>
+              <a:t> Doppler +</a:t>
+            </a:r>
+            <a:br>
+              <a:rPr lang="nl-NL" dirty="0" smtClean="0"/>
+            </a:br>
+            <a:r>
+              <a:rPr lang="nl-NL" dirty="0" smtClean="0"/>
+              <a:t>more accurate </a:t>
+            </a:r>
+            <a:r>
+              <a:rPr lang="nl-NL" dirty="0" err="1" smtClean="0"/>
+              <a:t>localisation</a:t>
+            </a:r>
+            <a:r>
+              <a:rPr lang="nl-NL" dirty="0" smtClean="0"/>
+              <a:t> </a:t>
+            </a:r>
+            <a:r>
+              <a:rPr lang="nl-NL" dirty="0" err="1" smtClean="0"/>
+              <a:t>using</a:t>
+            </a:r>
+            <a:r>
+              <a:rPr lang="nl-NL" dirty="0" smtClean="0"/>
+              <a:t> </a:t>
+            </a:r>
+            <a:r>
+              <a:rPr lang="nl-NL" dirty="0" err="1" smtClean="0"/>
+              <a:t>actual</a:t>
+            </a:r>
+            <a:r>
+              <a:rPr lang="nl-NL" dirty="0" smtClean="0"/>
+              <a:t> speed of sound </a:t>
+            </a:r>
+            <a:r>
+              <a:rPr lang="nl-NL" dirty="0" err="1" smtClean="0"/>
+              <a:t>and</a:t>
+            </a:r>
+            <a:r>
+              <a:rPr lang="nl-NL" dirty="0" smtClean="0"/>
+              <a:t> QR</a:t>
+            </a:r>
+          </a:p>
+          <a:p>
+            <a:pPr lvl="1">
+              <a:lnSpc>
+                <a:spcPct val="150000"/>
+              </a:lnSpc>
+            </a:pPr>
+            <a:endParaRPr lang="nl-NL" dirty="0"/>
+          </a:p>
+        </p:txBody>
+      </p:sp>
+    </p:spTree>
+    <p:extLst>
+      <p:ext uri="{BB962C8B-B14F-4D97-AF65-F5344CB8AC3E}">
+        <p14:creationId xmlns:p14="http://schemas.microsoft.com/office/powerpoint/2010/main" val="3107139150"/>
+      </p:ext>
+    </p:extLst>
+  </p:cSld>
+  <p:clrMapOvr>
+    <a:masterClrMapping/>
+  </p:clrMapOvr>
+  <p:timing>
+    <p:tnLst>
+      <p:par>
+        <p:cTn id="1" dur="indefinite" restart="never" nodeType="tmRoot"/>
       </p:par>
     </p:tnLst>
   </p:timing>
@@ -4844,7 +5479,7 @@
   <p:timing>
     <p:tnLst>
       <p:par>
-        <p:cTn xmlns:p14="http://schemas.microsoft.com/office/powerpoint/2010/main" id="1" dur="indefinite" restart="never" nodeType="tmRoot"/>
+        <p:cTn id="1" dur="indefinite" restart="never" nodeType="tmRoot"/>
       </p:par>
     </p:tnLst>
   </p:timing>
@@ -4885,215 +5520,77 @@
           <a:p>
             <a:r>
               <a:rPr lang="nl-NL" dirty="0" smtClean="0"/>
-              <a:t>Final </a:t>
+              <a:t>System </a:t>
             </a:r>
             <a:r>
               <a:rPr lang="nl-NL" dirty="0" err="1" smtClean="0"/>
-              <a:t>thoughts</a:t>
+              <a:t>overview</a:t>
             </a:r>
             <a:endParaRPr lang="nl-NL" dirty="0"/>
           </a:p>
         </p:txBody>
       </p:sp>
-      <p:sp>
-        <p:nvSpPr>
-          <p:cNvPr id="3" name="Tijdelijke aanduiding voor inhoud 2"/>
-          <p:cNvSpPr>
-            <a:spLocks noGrp="1"/>
-          </p:cNvSpPr>
+      <p:graphicFrame>
+        <p:nvGraphicFramePr>
+          <p:cNvPr id="4" name="Object 3"/>
+          <p:cNvGraphicFramePr>
+            <a:graphicFrameLocks noChangeAspect="1"/>
+          </p:cNvGraphicFramePr>
           <p:nvPr>
-            <p:ph idx="1"/>
+            <p:extLst>
+              <p:ext uri="{D42A27DB-BD31-4B8C-83A1-F6EECF244321}">
+                <p14:modId xmlns:p14="http://schemas.microsoft.com/office/powerpoint/2010/main" val="3591845776"/>
+              </p:ext>
+            </p:extLst>
           </p:nvPr>
-        </p:nvSpPr>
-        <p:spPr/>
-        <p:txBody>
-          <a:bodyPr/>
-          <a:lstStyle/>
-          <a:p>
-            <a:pPr>
-              <a:lnSpc>
-                <a:spcPct val="150000"/>
-              </a:lnSpc>
-            </a:pPr>
-            <a:r>
-              <a:rPr lang="nl-NL" dirty="0" err="1" smtClean="0"/>
-              <a:t>Working</a:t>
-            </a:r>
-            <a:r>
-              <a:rPr lang="nl-NL" dirty="0" smtClean="0"/>
-              <a:t> prototype (up </a:t>
-            </a:r>
-            <a:r>
-              <a:rPr lang="nl-NL" dirty="0" err="1" smtClean="0"/>
-              <a:t>to</a:t>
-            </a:r>
-            <a:r>
-              <a:rPr lang="nl-NL" dirty="0" smtClean="0"/>
-              <a:t> </a:t>
-            </a:r>
-            <a:r>
-              <a:rPr lang="nl-NL" dirty="0" err="1" smtClean="0"/>
-              <a:t>challenge</a:t>
-            </a:r>
-            <a:r>
-              <a:rPr lang="nl-NL" dirty="0" smtClean="0"/>
-              <a:t> 2, </a:t>
-            </a:r>
-            <a:r>
-              <a:rPr lang="nl-NL" dirty="0" err="1" smtClean="0"/>
-              <a:t>for</a:t>
-            </a:r>
-            <a:r>
-              <a:rPr lang="nl-NL" dirty="0" smtClean="0"/>
-              <a:t> </a:t>
-            </a:r>
-            <a:r>
-              <a:rPr lang="nl-NL" dirty="0" err="1" smtClean="0"/>
-              <a:t>lack</a:t>
-            </a:r>
-            <a:r>
-              <a:rPr lang="nl-NL" dirty="0" smtClean="0"/>
-              <a:t> of more </a:t>
-            </a:r>
-            <a:r>
-              <a:rPr lang="nl-NL" dirty="0" err="1" smtClean="0"/>
-              <a:t>testing</a:t>
-            </a:r>
-            <a:r>
-              <a:rPr lang="nl-NL" dirty="0" smtClean="0"/>
-              <a:t>)</a:t>
-            </a:r>
-            <a:br>
-              <a:rPr lang="nl-NL" dirty="0" smtClean="0"/>
-            </a:br>
-            <a:endParaRPr lang="nl-NL" dirty="0" smtClean="0"/>
-          </a:p>
-          <a:p>
-            <a:pPr>
-              <a:lnSpc>
-                <a:spcPct val="150000"/>
-              </a:lnSpc>
-            </a:pPr>
-            <a:r>
-              <a:rPr lang="nl-NL" dirty="0" smtClean="0"/>
-              <a:t>TODO:</a:t>
-            </a:r>
-          </a:p>
-          <a:p>
-            <a:pPr lvl="1">
-              <a:lnSpc>
-                <a:spcPct val="150000"/>
-              </a:lnSpc>
-            </a:pPr>
-            <a:r>
-              <a:rPr lang="nl-NL" dirty="0" smtClean="0"/>
-              <a:t>Fix ASIO lag</a:t>
-            </a:r>
-          </a:p>
-          <a:p>
-            <a:pPr lvl="1">
-              <a:lnSpc>
-                <a:spcPct val="150000"/>
-              </a:lnSpc>
-            </a:pPr>
-            <a:r>
-              <a:rPr lang="nl-NL" dirty="0" smtClean="0"/>
-              <a:t>Small </a:t>
-            </a:r>
-            <a:r>
-              <a:rPr lang="nl-NL" dirty="0" err="1" smtClean="0"/>
-              <a:t>improvements</a:t>
-            </a:r>
-            <a:r>
-              <a:rPr lang="nl-NL" dirty="0" smtClean="0"/>
-              <a:t> </a:t>
-            </a:r>
-            <a:r>
-              <a:rPr lang="nl-NL" dirty="0" err="1" smtClean="0"/>
-              <a:t>to</a:t>
-            </a:r>
-            <a:r>
-              <a:rPr lang="nl-NL" dirty="0" smtClean="0"/>
-              <a:t> </a:t>
-            </a:r>
-            <a:r>
-              <a:rPr lang="nl-NL" dirty="0" err="1" smtClean="0"/>
-              <a:t>obstacle</a:t>
-            </a:r>
-            <a:r>
-              <a:rPr lang="nl-NL" dirty="0" smtClean="0"/>
-              <a:t> </a:t>
-            </a:r>
-            <a:r>
-              <a:rPr lang="nl-NL" dirty="0" err="1" smtClean="0"/>
-              <a:t>detection</a:t>
-            </a:r>
-            <a:r>
-              <a:rPr lang="nl-NL" dirty="0" smtClean="0"/>
-              <a:t> </a:t>
-            </a:r>
-            <a:r>
-              <a:rPr lang="nl-NL" dirty="0" err="1" smtClean="0"/>
-              <a:t>using</a:t>
-            </a:r>
-            <a:r>
-              <a:rPr lang="nl-NL" dirty="0" smtClean="0"/>
-              <a:t> Doppler +</a:t>
-            </a:r>
-            <a:br>
-              <a:rPr lang="nl-NL" dirty="0" smtClean="0"/>
-            </a:br>
-            <a:r>
-              <a:rPr lang="nl-NL" dirty="0" smtClean="0"/>
-              <a:t>more accurate </a:t>
-            </a:r>
-            <a:r>
-              <a:rPr lang="nl-NL" dirty="0" err="1" smtClean="0"/>
-              <a:t>localisation</a:t>
-            </a:r>
-            <a:r>
-              <a:rPr lang="nl-NL" dirty="0" smtClean="0"/>
-              <a:t> </a:t>
-            </a:r>
-            <a:r>
-              <a:rPr lang="nl-NL" dirty="0" err="1" smtClean="0"/>
-              <a:t>using</a:t>
-            </a:r>
-            <a:r>
-              <a:rPr lang="nl-NL" dirty="0" smtClean="0"/>
-              <a:t> </a:t>
-            </a:r>
-            <a:r>
-              <a:rPr lang="nl-NL" dirty="0" err="1" smtClean="0"/>
-              <a:t>actual</a:t>
-            </a:r>
-            <a:r>
-              <a:rPr lang="nl-NL" dirty="0" smtClean="0"/>
-              <a:t> speed of sound </a:t>
-            </a:r>
-            <a:r>
-              <a:rPr lang="nl-NL" dirty="0" err="1" smtClean="0"/>
-              <a:t>and</a:t>
-            </a:r>
-            <a:r>
-              <a:rPr lang="nl-NL" dirty="0" smtClean="0"/>
-              <a:t> QR</a:t>
-            </a:r>
-          </a:p>
-          <a:p>
-            <a:pPr lvl="1">
-              <a:lnSpc>
-                <a:spcPct val="150000"/>
-              </a:lnSpc>
-            </a:pPr>
-            <a:endParaRPr lang="nl-NL" dirty="0"/>
-          </a:p>
-        </p:txBody>
-      </p:sp>
+        </p:nvGraphicFramePr>
+        <p:xfrm>
+          <a:off x="630058" y="1509144"/>
+          <a:ext cx="7925511" cy="4236049"/>
+        </p:xfrm>
+        <a:graphic>
+          <a:graphicData uri="http://schemas.openxmlformats.org/presentationml/2006/ole">
+            <mc:AlternateContent xmlns:mc="http://schemas.openxmlformats.org/markup-compatibility/2006">
+              <mc:Choice xmlns:v="urn:schemas-microsoft-com:vml" Requires="v">
+                <p:oleObj spid="_x0000_s1027" name="Visio" r:id="rId3" imgW="6076891" imgH="3248120" progId="Visio.Drawing.15">
+                  <p:embed/>
+                </p:oleObj>
+              </mc:Choice>
+              <mc:Fallback>
+                <p:oleObj name="Visio" r:id="rId3" imgW="6076891" imgH="3248120" progId="Visio.Drawing.15">
+                  <p:embed/>
+                  <p:pic>
+                    <p:nvPicPr>
+                      <p:cNvPr id="0" name=""/>
+                      <p:cNvPicPr/>
+                      <p:nvPr/>
+                    </p:nvPicPr>
+                    <p:blipFill>
+                      <a:blip r:embed="rId4"/>
+                      <a:stretch>
+                        <a:fillRect/>
+                      </a:stretch>
+                    </p:blipFill>
+                    <p:spPr>
+                      <a:xfrm>
+                        <a:off x="630058" y="1509144"/>
+                        <a:ext cx="7925511" cy="4236049"/>
+                      </a:xfrm>
+                      <a:prstGeom prst="rect">
+                        <a:avLst/>
+                      </a:prstGeom>
+                    </p:spPr>
+                  </p:pic>
+                </p:oleObj>
+              </mc:Fallback>
+            </mc:AlternateContent>
+          </a:graphicData>
+        </a:graphic>
+      </p:graphicFrame>
     </p:spTree>
     <p:extLst>
       <p:ext uri="{BB962C8B-B14F-4D97-AF65-F5344CB8AC3E}">
-        <p14:creationId xmlns:p14="http://schemas.microsoft.com/office/powerpoint/2010/main" val="3107139150"/>
+        <p14:creationId xmlns:p14="http://schemas.microsoft.com/office/powerpoint/2010/main" val="837842893"/>
       </p:ext>
     </p:extLst>
   </p:cSld>
@@ -5103,7 +5600,1996 @@
   <p:timing>
     <p:tnLst>
       <p:par>
-        <p:cTn xmlns:p14="http://schemas.microsoft.com/office/powerpoint/2010/main" id="1" dur="indefinite" restart="never" nodeType="tmRoot"/>
+        <p:cTn id="1" dur="indefinite" restart="never" nodeType="tmRoot"/>
+      </p:par>
+    </p:tnLst>
+  </p:timing>
+</p:sld>
+</file>
+
+<file path=ppt/slides/slide4.xml><?xml version="1.0" encoding="utf-8"?>
+<p:sld xmlns:a="http://schemas.openxmlformats.org/drawingml/2006/main" xmlns:r="http://schemas.openxmlformats.org/officeDocument/2006/relationships" xmlns:p="http://schemas.openxmlformats.org/presentationml/2006/main">
+  <p:cSld>
+    <p:spTree>
+      <p:nvGrpSpPr>
+        <p:cNvPr id="1" name=""/>
+        <p:cNvGrpSpPr/>
+        <p:nvPr/>
+      </p:nvGrpSpPr>
+      <p:grpSpPr>
+        <a:xfrm>
+          <a:off x="0" y="0"/>
+          <a:ext cx="0" cy="0"/>
+          <a:chOff x="0" y="0"/>
+          <a:chExt cx="0" cy="0"/>
+        </a:xfrm>
+      </p:grpSpPr>
+      <p:sp>
+        <p:nvSpPr>
+          <p:cNvPr id="2" name="Title 1"/>
+          <p:cNvSpPr>
+            <a:spLocks noGrp="1"/>
+          </p:cNvSpPr>
+          <p:nvPr>
+            <p:ph type="title"/>
+          </p:nvPr>
+        </p:nvSpPr>
+        <p:spPr/>
+        <p:txBody>
+          <a:bodyPr/>
+          <a:lstStyle/>
+          <a:p>
+            <a:r>
+              <a:rPr lang="en-US" dirty="0" smtClean="0"/>
+              <a:t>Contactless charging</a:t>
+            </a:r>
+            <a:endParaRPr lang="en-US" dirty="0"/>
+          </a:p>
+        </p:txBody>
+      </p:sp>
+      <p:sp>
+        <p:nvSpPr>
+          <p:cNvPr id="6" name="Title 1"/>
+          <p:cNvSpPr txBox="1">
+            <a:spLocks/>
+          </p:cNvSpPr>
+          <p:nvPr/>
+        </p:nvSpPr>
+        <p:spPr bwMode="auto">
+          <a:xfrm>
+            <a:off x="994762" y="5621915"/>
+            <a:ext cx="7159625" cy="436096"/>
+          </a:xfrm>
+          <a:prstGeom prst="rect">
+            <a:avLst/>
+          </a:prstGeom>
+          <a:noFill/>
+          <a:ln>
+            <a:noFill/>
+          </a:ln>
+          <a:extLst>
+            <a:ext uri="{909E8E84-426E-40DD-AFC4-6F175D3DCCD1}">
+              <a14:hiddenFill xmlns:a14="http://schemas.microsoft.com/office/drawing/2010/main">
+                <a:solidFill>
+                  <a:srgbClr val="FFFFFF"/>
+                </a:solidFill>
+              </a14:hiddenFill>
+            </a:ext>
+            <a:ext uri="{91240B29-F687-4F45-9708-019B960494DF}">
+              <a14:hiddenLine xmlns:a14="http://schemas.microsoft.com/office/drawing/2010/main" w="9525">
+                <a:solidFill>
+                  <a:srgbClr val="000000"/>
+                </a:solidFill>
+                <a:miter lim="800000"/>
+                <a:headEnd/>
+                <a:tailEnd/>
+              </a14:hiddenLine>
+            </a:ext>
+          </a:extLst>
+        </p:spPr>
+        <p:txBody>
+          <a:bodyPr vert="horz" wrap="square" lIns="0" tIns="0" rIns="0" bIns="0" numCol="1" anchor="t" anchorCtr="0" compatLnSpc="1">
+            <a:prstTxWarp prst="textNoShape">
+              <a:avLst/>
+            </a:prstTxWarp>
+          </a:bodyPr>
+          <a:lstStyle>
+            <a:lvl1pPr marL="857250" indent="-857250" algn="l" rtl="0" eaLnBrk="0" fontAlgn="base" hangingPunct="0">
+              <a:spcBef>
+                <a:spcPct val="0"/>
+              </a:spcBef>
+              <a:spcAft>
+                <a:spcPct val="0"/>
+              </a:spcAft>
+              <a:defRPr sz="3300">
+                <a:solidFill>
+                  <a:schemeClr val="tx1"/>
+                </a:solidFill>
+                <a:latin typeface="+mj-lt"/>
+                <a:ea typeface="ＭＳ Ｐゴシック" charset="-128"/>
+                <a:cs typeface="ＭＳ Ｐゴシック" charset="-128"/>
+              </a:defRPr>
+            </a:lvl1pPr>
+            <a:lvl2pPr marL="857250" indent="-857250" algn="l" rtl="0" eaLnBrk="0" fontAlgn="base" hangingPunct="0">
+              <a:spcBef>
+                <a:spcPct val="0"/>
+              </a:spcBef>
+              <a:spcAft>
+                <a:spcPct val="0"/>
+              </a:spcAft>
+              <a:defRPr sz="3300">
+                <a:solidFill>
+                  <a:schemeClr val="tx1"/>
+                </a:solidFill>
+                <a:latin typeface="Bookman Old Style" pitchFamily="18" charset="0"/>
+                <a:ea typeface="ＭＳ Ｐゴシック" charset="-128"/>
+                <a:cs typeface="ＭＳ Ｐゴシック" charset="-128"/>
+              </a:defRPr>
+            </a:lvl2pPr>
+            <a:lvl3pPr marL="857250" indent="-857250" algn="l" rtl="0" eaLnBrk="0" fontAlgn="base" hangingPunct="0">
+              <a:spcBef>
+                <a:spcPct val="0"/>
+              </a:spcBef>
+              <a:spcAft>
+                <a:spcPct val="0"/>
+              </a:spcAft>
+              <a:defRPr sz="3300">
+                <a:solidFill>
+                  <a:schemeClr val="tx1"/>
+                </a:solidFill>
+                <a:latin typeface="Bookman Old Style" pitchFamily="18" charset="0"/>
+                <a:ea typeface="ＭＳ Ｐゴシック" charset="-128"/>
+                <a:cs typeface="ＭＳ Ｐゴシック" charset="-128"/>
+              </a:defRPr>
+            </a:lvl3pPr>
+            <a:lvl4pPr marL="857250" indent="-857250" algn="l" rtl="0" eaLnBrk="0" fontAlgn="base" hangingPunct="0">
+              <a:spcBef>
+                <a:spcPct val="0"/>
+              </a:spcBef>
+              <a:spcAft>
+                <a:spcPct val="0"/>
+              </a:spcAft>
+              <a:defRPr sz="3300">
+                <a:solidFill>
+                  <a:schemeClr val="tx1"/>
+                </a:solidFill>
+                <a:latin typeface="Bookman Old Style" pitchFamily="18" charset="0"/>
+                <a:ea typeface="ＭＳ Ｐゴシック" charset="-128"/>
+                <a:cs typeface="ＭＳ Ｐゴシック" charset="-128"/>
+              </a:defRPr>
+            </a:lvl4pPr>
+            <a:lvl5pPr marL="857250" indent="-857250" algn="l" rtl="0" eaLnBrk="0" fontAlgn="base" hangingPunct="0">
+              <a:spcBef>
+                <a:spcPct val="0"/>
+              </a:spcBef>
+              <a:spcAft>
+                <a:spcPct val="0"/>
+              </a:spcAft>
+              <a:defRPr sz="3300">
+                <a:solidFill>
+                  <a:schemeClr val="tx1"/>
+                </a:solidFill>
+                <a:latin typeface="Bookman Old Style" pitchFamily="18" charset="0"/>
+                <a:ea typeface="ＭＳ Ｐゴシック" charset="-128"/>
+                <a:cs typeface="ＭＳ Ｐゴシック" charset="-128"/>
+              </a:defRPr>
+            </a:lvl5pPr>
+            <a:lvl6pPr marL="1314450" indent="-857250" algn="l" rtl="0" eaLnBrk="0" fontAlgn="base" hangingPunct="0">
+              <a:spcBef>
+                <a:spcPct val="0"/>
+              </a:spcBef>
+              <a:spcAft>
+                <a:spcPct val="0"/>
+              </a:spcAft>
+              <a:defRPr sz="3300">
+                <a:solidFill>
+                  <a:schemeClr val="tx1"/>
+                </a:solidFill>
+                <a:latin typeface="Bookman Old Style" pitchFamily="18" charset="0"/>
+              </a:defRPr>
+            </a:lvl6pPr>
+            <a:lvl7pPr marL="1771650" indent="-857250" algn="l" rtl="0" eaLnBrk="0" fontAlgn="base" hangingPunct="0">
+              <a:spcBef>
+                <a:spcPct val="0"/>
+              </a:spcBef>
+              <a:spcAft>
+                <a:spcPct val="0"/>
+              </a:spcAft>
+              <a:defRPr sz="3300">
+                <a:solidFill>
+                  <a:schemeClr val="tx1"/>
+                </a:solidFill>
+                <a:latin typeface="Bookman Old Style" pitchFamily="18" charset="0"/>
+              </a:defRPr>
+            </a:lvl7pPr>
+            <a:lvl8pPr marL="2228850" indent="-857250" algn="l" rtl="0" eaLnBrk="0" fontAlgn="base" hangingPunct="0">
+              <a:spcBef>
+                <a:spcPct val="0"/>
+              </a:spcBef>
+              <a:spcAft>
+                <a:spcPct val="0"/>
+              </a:spcAft>
+              <a:defRPr sz="3300">
+                <a:solidFill>
+                  <a:schemeClr val="tx1"/>
+                </a:solidFill>
+                <a:latin typeface="Bookman Old Style" pitchFamily="18" charset="0"/>
+              </a:defRPr>
+            </a:lvl8pPr>
+            <a:lvl9pPr marL="2686050" indent="-857250" algn="l" rtl="0" eaLnBrk="0" fontAlgn="base" hangingPunct="0">
+              <a:spcBef>
+                <a:spcPct val="0"/>
+              </a:spcBef>
+              <a:spcAft>
+                <a:spcPct val="0"/>
+              </a:spcAft>
+              <a:defRPr sz="3300">
+                <a:solidFill>
+                  <a:schemeClr val="tx1"/>
+                </a:solidFill>
+                <a:latin typeface="Bookman Old Style" pitchFamily="18" charset="0"/>
+              </a:defRPr>
+            </a:lvl9pPr>
+          </a:lstStyle>
+          <a:p>
+            <a:pPr algn="ctr"/>
+            <a:r>
+              <a:rPr lang="en-US" sz="2000" dirty="0" smtClean="0"/>
+              <a:t>Charged KITT within 3 minutes and 45 seconds!</a:t>
+            </a:r>
+            <a:endParaRPr lang="en-US" sz="2000" dirty="0"/>
+          </a:p>
+        </p:txBody>
+      </p:sp>
+      <p:pic>
+        <p:nvPicPr>
+          <p:cNvPr id="3" name="Picture 2" descr="contactless_charging.PNG"/>
+          <p:cNvPicPr>
+            <a:picLocks noChangeAspect="1"/>
+          </p:cNvPicPr>
+          <p:nvPr/>
+        </p:nvPicPr>
+        <p:blipFill>
+          <a:blip r:embed="rId2">
+            <a:extLst>
+              <a:ext uri="{28A0092B-C50C-407E-A947-70E740481C1C}">
+                <a14:useLocalDpi xmlns:a14="http://schemas.microsoft.com/office/drawing/2010/main" val="0"/>
+              </a:ext>
+            </a:extLst>
+          </a:blip>
+          <a:stretch>
+            <a:fillRect/>
+          </a:stretch>
+        </p:blipFill>
+        <p:spPr>
+          <a:xfrm>
+            <a:off x="1277798" y="2176504"/>
+            <a:ext cx="6712313" cy="2934529"/>
+          </a:xfrm>
+          <a:prstGeom prst="rect">
+            <a:avLst/>
+          </a:prstGeom>
+        </p:spPr>
+      </p:pic>
+    </p:spTree>
+    <p:extLst>
+      <p:ext uri="{BB962C8B-B14F-4D97-AF65-F5344CB8AC3E}">
+        <p14:creationId xmlns:p14="http://schemas.microsoft.com/office/powerpoint/2010/main" val="654473428"/>
+      </p:ext>
+    </p:extLst>
+  </p:cSld>
+  <p:clrMapOvr>
+    <a:masterClrMapping/>
+  </p:clrMapOvr>
+  <p:timing>
+    <p:tnLst>
+      <p:par>
+        <p:cTn id="1" dur="indefinite" restart="never" nodeType="tmRoot"/>
+      </p:par>
+    </p:tnLst>
+  </p:timing>
+</p:sld>
+</file>
+
+<file path=ppt/slides/slide5.xml><?xml version="1.0" encoding="utf-8"?>
+<p:sld xmlns:a="http://schemas.openxmlformats.org/drawingml/2006/main" xmlns:r="http://schemas.openxmlformats.org/officeDocument/2006/relationships" xmlns:p="http://schemas.openxmlformats.org/presentationml/2006/main">
+  <p:cSld>
+    <p:spTree>
+      <p:nvGrpSpPr>
+        <p:cNvPr id="1" name=""/>
+        <p:cNvGrpSpPr/>
+        <p:nvPr/>
+      </p:nvGrpSpPr>
+      <p:grpSpPr>
+        <a:xfrm>
+          <a:off x="0" y="0"/>
+          <a:ext cx="0" cy="0"/>
+          <a:chOff x="0" y="0"/>
+          <a:chExt cx="0" cy="0"/>
+        </a:xfrm>
+      </p:grpSpPr>
+      <p:sp>
+        <p:nvSpPr>
+          <p:cNvPr id="2" name="Title 1"/>
+          <p:cNvSpPr>
+            <a:spLocks noGrp="1"/>
+          </p:cNvSpPr>
+          <p:nvPr>
+            <p:ph type="title"/>
+          </p:nvPr>
+        </p:nvSpPr>
+        <p:spPr/>
+        <p:txBody>
+          <a:bodyPr/>
+          <a:lstStyle/>
+          <a:p>
+            <a:r>
+              <a:rPr lang="en-US" dirty="0" smtClean="0"/>
+              <a:t>Localization</a:t>
+            </a:r>
+            <a:endParaRPr lang="en-US" dirty="0"/>
+          </a:p>
+        </p:txBody>
+      </p:sp>
+      <p:sp>
+        <p:nvSpPr>
+          <p:cNvPr id="6" name="Title 1"/>
+          <p:cNvSpPr txBox="1">
+            <a:spLocks/>
+          </p:cNvSpPr>
+          <p:nvPr/>
+        </p:nvSpPr>
+        <p:spPr bwMode="auto">
+          <a:xfrm>
+            <a:off x="948296" y="1096334"/>
+            <a:ext cx="7159625" cy="470340"/>
+          </a:xfrm>
+          <a:prstGeom prst="rect">
+            <a:avLst/>
+          </a:prstGeom>
+          <a:noFill/>
+          <a:ln>
+            <a:noFill/>
+          </a:ln>
+          <a:extLst>
+            <a:ext uri="{909E8E84-426E-40DD-AFC4-6F175D3DCCD1}">
+              <a14:hiddenFill xmlns:a14="http://schemas.microsoft.com/office/drawing/2010/main">
+                <a:solidFill>
+                  <a:srgbClr val="FFFFFF"/>
+                </a:solidFill>
+              </a14:hiddenFill>
+            </a:ext>
+            <a:ext uri="{91240B29-F687-4F45-9708-019B960494DF}">
+              <a14:hiddenLine xmlns:a14="http://schemas.microsoft.com/office/drawing/2010/main" w="9525">
+                <a:solidFill>
+                  <a:srgbClr val="000000"/>
+                </a:solidFill>
+                <a:miter lim="800000"/>
+                <a:headEnd/>
+                <a:tailEnd/>
+              </a14:hiddenLine>
+            </a:ext>
+          </a:extLst>
+        </p:spPr>
+        <p:txBody>
+          <a:bodyPr vert="horz" wrap="square" lIns="0" tIns="0" rIns="0" bIns="0" numCol="1" anchor="t" anchorCtr="0" compatLnSpc="1">
+            <a:prstTxWarp prst="textNoShape">
+              <a:avLst/>
+            </a:prstTxWarp>
+          </a:bodyPr>
+          <a:lstStyle>
+            <a:lvl1pPr marL="857250" indent="-857250" algn="l" rtl="0" eaLnBrk="0" fontAlgn="base" hangingPunct="0">
+              <a:spcBef>
+                <a:spcPct val="0"/>
+              </a:spcBef>
+              <a:spcAft>
+                <a:spcPct val="0"/>
+              </a:spcAft>
+              <a:defRPr sz="3300">
+                <a:solidFill>
+                  <a:schemeClr val="tx1"/>
+                </a:solidFill>
+                <a:latin typeface="+mj-lt"/>
+                <a:ea typeface="ＭＳ Ｐゴシック" charset="-128"/>
+                <a:cs typeface="ＭＳ Ｐゴシック" charset="-128"/>
+              </a:defRPr>
+            </a:lvl1pPr>
+            <a:lvl2pPr marL="857250" indent="-857250" algn="l" rtl="0" eaLnBrk="0" fontAlgn="base" hangingPunct="0">
+              <a:spcBef>
+                <a:spcPct val="0"/>
+              </a:spcBef>
+              <a:spcAft>
+                <a:spcPct val="0"/>
+              </a:spcAft>
+              <a:defRPr sz="3300">
+                <a:solidFill>
+                  <a:schemeClr val="tx1"/>
+                </a:solidFill>
+                <a:latin typeface="Bookman Old Style" pitchFamily="18" charset="0"/>
+                <a:ea typeface="ＭＳ Ｐゴシック" charset="-128"/>
+                <a:cs typeface="ＭＳ Ｐゴシック" charset="-128"/>
+              </a:defRPr>
+            </a:lvl2pPr>
+            <a:lvl3pPr marL="857250" indent="-857250" algn="l" rtl="0" eaLnBrk="0" fontAlgn="base" hangingPunct="0">
+              <a:spcBef>
+                <a:spcPct val="0"/>
+              </a:spcBef>
+              <a:spcAft>
+                <a:spcPct val="0"/>
+              </a:spcAft>
+              <a:defRPr sz="3300">
+                <a:solidFill>
+                  <a:schemeClr val="tx1"/>
+                </a:solidFill>
+                <a:latin typeface="Bookman Old Style" pitchFamily="18" charset="0"/>
+                <a:ea typeface="ＭＳ Ｐゴシック" charset="-128"/>
+                <a:cs typeface="ＭＳ Ｐゴシック" charset="-128"/>
+              </a:defRPr>
+            </a:lvl3pPr>
+            <a:lvl4pPr marL="857250" indent="-857250" algn="l" rtl="0" eaLnBrk="0" fontAlgn="base" hangingPunct="0">
+              <a:spcBef>
+                <a:spcPct val="0"/>
+              </a:spcBef>
+              <a:spcAft>
+                <a:spcPct val="0"/>
+              </a:spcAft>
+              <a:defRPr sz="3300">
+                <a:solidFill>
+                  <a:schemeClr val="tx1"/>
+                </a:solidFill>
+                <a:latin typeface="Bookman Old Style" pitchFamily="18" charset="0"/>
+                <a:ea typeface="ＭＳ Ｐゴシック" charset="-128"/>
+                <a:cs typeface="ＭＳ Ｐゴシック" charset="-128"/>
+              </a:defRPr>
+            </a:lvl4pPr>
+            <a:lvl5pPr marL="857250" indent="-857250" algn="l" rtl="0" eaLnBrk="0" fontAlgn="base" hangingPunct="0">
+              <a:spcBef>
+                <a:spcPct val="0"/>
+              </a:spcBef>
+              <a:spcAft>
+                <a:spcPct val="0"/>
+              </a:spcAft>
+              <a:defRPr sz="3300">
+                <a:solidFill>
+                  <a:schemeClr val="tx1"/>
+                </a:solidFill>
+                <a:latin typeface="Bookman Old Style" pitchFamily="18" charset="0"/>
+                <a:ea typeface="ＭＳ Ｐゴシック" charset="-128"/>
+                <a:cs typeface="ＭＳ Ｐゴシック" charset="-128"/>
+              </a:defRPr>
+            </a:lvl5pPr>
+            <a:lvl6pPr marL="1314450" indent="-857250" algn="l" rtl="0" eaLnBrk="0" fontAlgn="base" hangingPunct="0">
+              <a:spcBef>
+                <a:spcPct val="0"/>
+              </a:spcBef>
+              <a:spcAft>
+                <a:spcPct val="0"/>
+              </a:spcAft>
+              <a:defRPr sz="3300">
+                <a:solidFill>
+                  <a:schemeClr val="tx1"/>
+                </a:solidFill>
+                <a:latin typeface="Bookman Old Style" pitchFamily="18" charset="0"/>
+              </a:defRPr>
+            </a:lvl6pPr>
+            <a:lvl7pPr marL="1771650" indent="-857250" algn="l" rtl="0" eaLnBrk="0" fontAlgn="base" hangingPunct="0">
+              <a:spcBef>
+                <a:spcPct val="0"/>
+              </a:spcBef>
+              <a:spcAft>
+                <a:spcPct val="0"/>
+              </a:spcAft>
+              <a:defRPr sz="3300">
+                <a:solidFill>
+                  <a:schemeClr val="tx1"/>
+                </a:solidFill>
+                <a:latin typeface="Bookman Old Style" pitchFamily="18" charset="0"/>
+              </a:defRPr>
+            </a:lvl7pPr>
+            <a:lvl8pPr marL="2228850" indent="-857250" algn="l" rtl="0" eaLnBrk="0" fontAlgn="base" hangingPunct="0">
+              <a:spcBef>
+                <a:spcPct val="0"/>
+              </a:spcBef>
+              <a:spcAft>
+                <a:spcPct val="0"/>
+              </a:spcAft>
+              <a:defRPr sz="3300">
+                <a:solidFill>
+                  <a:schemeClr val="tx1"/>
+                </a:solidFill>
+                <a:latin typeface="Bookman Old Style" pitchFamily="18" charset="0"/>
+              </a:defRPr>
+            </a:lvl8pPr>
+            <a:lvl9pPr marL="2686050" indent="-857250" algn="l" rtl="0" eaLnBrk="0" fontAlgn="base" hangingPunct="0">
+              <a:spcBef>
+                <a:spcPct val="0"/>
+              </a:spcBef>
+              <a:spcAft>
+                <a:spcPct val="0"/>
+              </a:spcAft>
+              <a:defRPr sz="3300">
+                <a:solidFill>
+                  <a:schemeClr val="tx1"/>
+                </a:solidFill>
+                <a:latin typeface="Bookman Old Style" pitchFamily="18" charset="0"/>
+              </a:defRPr>
+            </a:lvl9pPr>
+          </a:lstStyle>
+          <a:p>
+            <a:r>
+              <a:rPr lang="en-US" sz="2000" dirty="0" smtClean="0"/>
+              <a:t>System overview</a:t>
+            </a:r>
+            <a:endParaRPr lang="en-US" sz="2000" dirty="0"/>
+          </a:p>
+        </p:txBody>
+      </p:sp>
+      <p:pic>
+        <p:nvPicPr>
+          <p:cNvPr id="3" name="Picture 2" descr="localization-overview.pdf"/>
+          <p:cNvPicPr>
+            <a:picLocks noChangeAspect="1"/>
+          </p:cNvPicPr>
+          <p:nvPr/>
+        </p:nvPicPr>
+        <p:blipFill>
+          <a:blip r:embed="rId2">
+            <a:extLst>
+              <a:ext uri="{28A0092B-C50C-407E-A947-70E740481C1C}">
+                <a14:useLocalDpi xmlns:a14="http://schemas.microsoft.com/office/drawing/2010/main" val="0"/>
+              </a:ext>
+            </a:extLst>
+          </a:blip>
+          <a:stretch>
+            <a:fillRect/>
+          </a:stretch>
+        </p:blipFill>
+        <p:spPr>
+          <a:xfrm>
+            <a:off x="859359" y="2411394"/>
+            <a:ext cx="7882474" cy="2705010"/>
+          </a:xfrm>
+          <a:prstGeom prst="rect">
+            <a:avLst/>
+          </a:prstGeom>
+        </p:spPr>
+      </p:pic>
+      <p:cxnSp>
+        <p:nvCxnSpPr>
+          <p:cNvPr id="10" name="Straight Arrow Connector 9"/>
+          <p:cNvCxnSpPr/>
+          <p:nvPr/>
+        </p:nvCxnSpPr>
+        <p:spPr bwMode="auto">
+          <a:xfrm flipH="1">
+            <a:off x="2060942" y="2524930"/>
+            <a:ext cx="722469" cy="714891"/>
+          </a:xfrm>
+          <a:prstGeom prst="straightConnector1">
+            <a:avLst/>
+          </a:prstGeom>
+          <a:ln>
+            <a:solidFill>
+              <a:srgbClr val="FF0000"/>
+            </a:solidFill>
+            <a:headEnd type="none" w="med" len="med"/>
+            <a:tailEnd type="arrow"/>
+          </a:ln>
+        </p:spPr>
+        <p:style>
+          <a:lnRef idx="2">
+            <a:schemeClr val="dk1"/>
+          </a:lnRef>
+          <a:fillRef idx="0">
+            <a:schemeClr val="dk1"/>
+          </a:fillRef>
+          <a:effectRef idx="1">
+            <a:schemeClr val="dk1"/>
+          </a:effectRef>
+          <a:fontRef idx="minor">
+            <a:schemeClr val="tx1"/>
+          </a:fontRef>
+        </p:style>
+      </p:cxnSp>
+      <p:cxnSp>
+        <p:nvCxnSpPr>
+          <p:cNvPr id="17" name="Straight Connector 16"/>
+          <p:cNvCxnSpPr/>
+          <p:nvPr/>
+        </p:nvCxnSpPr>
+        <p:spPr bwMode="auto">
+          <a:xfrm>
+            <a:off x="2778513" y="2530222"/>
+            <a:ext cx="1171187" cy="9778"/>
+          </a:xfrm>
+          <a:prstGeom prst="line">
+            <a:avLst/>
+          </a:prstGeom>
+          <a:ln>
+            <a:solidFill>
+              <a:srgbClr val="FF0000"/>
+            </a:solidFill>
+            <a:headEnd type="none" w="med" len="med"/>
+            <a:tailEnd type="none" w="med" len="med"/>
+          </a:ln>
+        </p:spPr>
+        <p:style>
+          <a:lnRef idx="2">
+            <a:schemeClr val="dk1"/>
+          </a:lnRef>
+          <a:fillRef idx="0">
+            <a:schemeClr val="dk1"/>
+          </a:fillRef>
+          <a:effectRef idx="1">
+            <a:schemeClr val="dk1"/>
+          </a:effectRef>
+          <a:fontRef idx="minor">
+            <a:schemeClr val="tx1"/>
+          </a:fontRef>
+        </p:style>
+      </p:cxnSp>
+      <p:sp>
+        <p:nvSpPr>
+          <p:cNvPr id="18" name="TextBox 17"/>
+          <p:cNvSpPr txBox="1"/>
+          <p:nvPr/>
+        </p:nvSpPr>
+        <p:spPr>
+          <a:xfrm>
+            <a:off x="2733150" y="2184400"/>
+            <a:ext cx="1309673" cy="338554"/>
+          </a:xfrm>
+          <a:prstGeom prst="rect">
+            <a:avLst/>
+          </a:prstGeom>
+          <a:noFill/>
+        </p:spPr>
+        <p:txBody>
+          <a:bodyPr wrap="none" rtlCol="0">
+            <a:spAutoFit/>
+          </a:bodyPr>
+          <a:lstStyle/>
+          <a:p>
+            <a:r>
+              <a:rPr lang="en-US" sz="1600" dirty="0" smtClean="0">
+                <a:solidFill>
+                  <a:srgbClr val="FF0000"/>
+                </a:solidFill>
+              </a:rPr>
+              <a:t>SVD filtering</a:t>
+            </a:r>
+            <a:endParaRPr lang="en-US" sz="1600" dirty="0">
+              <a:solidFill>
+                <a:srgbClr val="FF0000"/>
+              </a:solidFill>
+            </a:endParaRPr>
+          </a:p>
+        </p:txBody>
+      </p:sp>
+      <p:cxnSp>
+        <p:nvCxnSpPr>
+          <p:cNvPr id="20" name="Straight Arrow Connector 19"/>
+          <p:cNvCxnSpPr/>
+          <p:nvPr/>
+        </p:nvCxnSpPr>
+        <p:spPr bwMode="auto">
+          <a:xfrm flipH="1">
+            <a:off x="6852364" y="2527300"/>
+            <a:ext cx="8811" cy="712816"/>
+          </a:xfrm>
+          <a:prstGeom prst="straightConnector1">
+            <a:avLst/>
+          </a:prstGeom>
+          <a:ln>
+            <a:solidFill>
+              <a:srgbClr val="FF0000"/>
+            </a:solidFill>
+            <a:headEnd type="none" w="med" len="med"/>
+            <a:tailEnd type="arrow"/>
+          </a:ln>
+        </p:spPr>
+        <p:style>
+          <a:lnRef idx="2">
+            <a:schemeClr val="dk1"/>
+          </a:lnRef>
+          <a:fillRef idx="0">
+            <a:schemeClr val="dk1"/>
+          </a:fillRef>
+          <a:effectRef idx="1">
+            <a:schemeClr val="dk1"/>
+          </a:effectRef>
+          <a:fontRef idx="minor">
+            <a:schemeClr val="tx1"/>
+          </a:fontRef>
+        </p:style>
+      </p:cxnSp>
+      <p:cxnSp>
+        <p:nvCxnSpPr>
+          <p:cNvPr id="27" name="Straight Connector 26"/>
+          <p:cNvCxnSpPr/>
+          <p:nvPr/>
+        </p:nvCxnSpPr>
+        <p:spPr bwMode="auto">
+          <a:xfrm>
+            <a:off x="6848863" y="2536572"/>
+            <a:ext cx="1355337" cy="9778"/>
+          </a:xfrm>
+          <a:prstGeom prst="line">
+            <a:avLst/>
+          </a:prstGeom>
+          <a:ln>
+            <a:solidFill>
+              <a:srgbClr val="FF0000"/>
+            </a:solidFill>
+            <a:headEnd type="none" w="med" len="med"/>
+            <a:tailEnd type="none" w="med" len="med"/>
+          </a:ln>
+        </p:spPr>
+        <p:style>
+          <a:lnRef idx="2">
+            <a:schemeClr val="dk1"/>
+          </a:lnRef>
+          <a:fillRef idx="0">
+            <a:schemeClr val="dk1"/>
+          </a:fillRef>
+          <a:effectRef idx="1">
+            <a:schemeClr val="dk1"/>
+          </a:effectRef>
+          <a:fontRef idx="minor">
+            <a:schemeClr val="tx1"/>
+          </a:fontRef>
+        </p:style>
+      </p:cxnSp>
+      <p:sp>
+        <p:nvSpPr>
+          <p:cNvPr id="28" name="TextBox 27"/>
+          <p:cNvSpPr txBox="1"/>
+          <p:nvPr/>
+        </p:nvSpPr>
+        <p:spPr>
+          <a:xfrm>
+            <a:off x="6764095" y="2178050"/>
+            <a:ext cx="1477388" cy="338554"/>
+          </a:xfrm>
+          <a:prstGeom prst="rect">
+            <a:avLst/>
+          </a:prstGeom>
+          <a:noFill/>
+        </p:spPr>
+        <p:txBody>
+          <a:bodyPr wrap="none" rtlCol="0">
+            <a:spAutoFit/>
+          </a:bodyPr>
+          <a:lstStyle/>
+          <a:p>
+            <a:r>
+              <a:rPr lang="en-US" sz="1600" dirty="0" smtClean="0">
+                <a:solidFill>
+                  <a:srgbClr val="FF0000"/>
+                </a:solidFill>
+              </a:rPr>
+              <a:t>Signal filtering</a:t>
+            </a:r>
+            <a:endParaRPr lang="en-US" sz="1600" dirty="0">
+              <a:solidFill>
+                <a:srgbClr val="FF0000"/>
+              </a:solidFill>
+            </a:endParaRPr>
+          </a:p>
+        </p:txBody>
+      </p:sp>
+    </p:spTree>
+    <p:extLst>
+      <p:ext uri="{BB962C8B-B14F-4D97-AF65-F5344CB8AC3E}">
+        <p14:creationId xmlns:p14="http://schemas.microsoft.com/office/powerpoint/2010/main" val="3422663184"/>
+      </p:ext>
+    </p:extLst>
+  </p:cSld>
+  <p:clrMapOvr>
+    <a:masterClrMapping/>
+  </p:clrMapOvr>
+  <p:timing>
+    <p:tnLst>
+      <p:par>
+        <p:cTn id="1" dur="indefinite" restart="never" nodeType="tmRoot"/>
+      </p:par>
+    </p:tnLst>
+  </p:timing>
+</p:sld>
+</file>
+
+<file path=ppt/slides/slide6.xml><?xml version="1.0" encoding="utf-8"?>
+<p:sld xmlns:a="http://schemas.openxmlformats.org/drawingml/2006/main" xmlns:r="http://schemas.openxmlformats.org/officeDocument/2006/relationships" xmlns:p="http://schemas.openxmlformats.org/presentationml/2006/main">
+  <p:cSld>
+    <p:spTree>
+      <p:nvGrpSpPr>
+        <p:cNvPr id="1" name=""/>
+        <p:cNvGrpSpPr/>
+        <p:nvPr/>
+      </p:nvGrpSpPr>
+      <p:grpSpPr>
+        <a:xfrm>
+          <a:off x="0" y="0"/>
+          <a:ext cx="0" cy="0"/>
+          <a:chOff x="0" y="0"/>
+          <a:chExt cx="0" cy="0"/>
+        </a:xfrm>
+      </p:grpSpPr>
+      <p:sp>
+        <p:nvSpPr>
+          <p:cNvPr id="2" name="Title 1"/>
+          <p:cNvSpPr>
+            <a:spLocks noGrp="1"/>
+          </p:cNvSpPr>
+          <p:nvPr>
+            <p:ph type="title"/>
+          </p:nvPr>
+        </p:nvSpPr>
+        <p:spPr/>
+        <p:txBody>
+          <a:bodyPr/>
+          <a:lstStyle/>
+          <a:p>
+            <a:r>
+              <a:rPr lang="en-US" dirty="0" smtClean="0"/>
+              <a:t>Controlling KITT</a:t>
+            </a:r>
+            <a:endParaRPr lang="en-US" dirty="0"/>
+          </a:p>
+        </p:txBody>
+      </p:sp>
+      <p:pic>
+        <p:nvPicPr>
+          <p:cNvPr id="5" name="Picture 4" descr="Screen Shot 2014-06-16 at 23.11.28.png"/>
+          <p:cNvPicPr>
+            <a:picLocks noChangeAspect="1"/>
+          </p:cNvPicPr>
+          <p:nvPr/>
+        </p:nvPicPr>
+        <p:blipFill>
+          <a:blip r:embed="rId2">
+            <a:extLst>
+              <a:ext uri="{28A0092B-C50C-407E-A947-70E740481C1C}">
+                <a14:useLocalDpi xmlns:a14="http://schemas.microsoft.com/office/drawing/2010/main" val="0"/>
+              </a:ext>
+            </a:extLst>
+          </a:blip>
+          <a:stretch>
+            <a:fillRect/>
+          </a:stretch>
+        </p:blipFill>
+        <p:spPr>
+          <a:xfrm>
+            <a:off x="783310" y="2011466"/>
+            <a:ext cx="7735742" cy="3644911"/>
+          </a:xfrm>
+          <a:prstGeom prst="rect">
+            <a:avLst/>
+          </a:prstGeom>
+        </p:spPr>
+      </p:pic>
+      <p:sp>
+        <p:nvSpPr>
+          <p:cNvPr id="6" name="Title 1"/>
+          <p:cNvSpPr txBox="1">
+            <a:spLocks/>
+          </p:cNvSpPr>
+          <p:nvPr/>
+        </p:nvSpPr>
+        <p:spPr bwMode="auto">
+          <a:xfrm>
+            <a:off x="948296" y="1096334"/>
+            <a:ext cx="7159625" cy="470340"/>
+          </a:xfrm>
+          <a:prstGeom prst="rect">
+            <a:avLst/>
+          </a:prstGeom>
+          <a:noFill/>
+          <a:ln>
+            <a:noFill/>
+          </a:ln>
+          <a:extLst>
+            <a:ext uri="{909E8E84-426E-40DD-AFC4-6F175D3DCCD1}">
+              <a14:hiddenFill xmlns:a14="http://schemas.microsoft.com/office/drawing/2010/main">
+                <a:solidFill>
+                  <a:srgbClr val="FFFFFF"/>
+                </a:solidFill>
+              </a14:hiddenFill>
+            </a:ext>
+            <a:ext uri="{91240B29-F687-4F45-9708-019B960494DF}">
+              <a14:hiddenLine xmlns:a14="http://schemas.microsoft.com/office/drawing/2010/main" w="9525">
+                <a:solidFill>
+                  <a:srgbClr val="000000"/>
+                </a:solidFill>
+                <a:miter lim="800000"/>
+                <a:headEnd/>
+                <a:tailEnd/>
+              </a14:hiddenLine>
+            </a:ext>
+          </a:extLst>
+        </p:spPr>
+        <p:txBody>
+          <a:bodyPr vert="horz" wrap="square" lIns="0" tIns="0" rIns="0" bIns="0" numCol="1" anchor="t" anchorCtr="0" compatLnSpc="1">
+            <a:prstTxWarp prst="textNoShape">
+              <a:avLst/>
+            </a:prstTxWarp>
+          </a:bodyPr>
+          <a:lstStyle>
+            <a:lvl1pPr marL="857250" indent="-857250" algn="l" rtl="0" eaLnBrk="0" fontAlgn="base" hangingPunct="0">
+              <a:spcBef>
+                <a:spcPct val="0"/>
+              </a:spcBef>
+              <a:spcAft>
+                <a:spcPct val="0"/>
+              </a:spcAft>
+              <a:defRPr sz="3300">
+                <a:solidFill>
+                  <a:schemeClr val="tx1"/>
+                </a:solidFill>
+                <a:latin typeface="+mj-lt"/>
+                <a:ea typeface="ＭＳ Ｐゴシック" charset="-128"/>
+                <a:cs typeface="ＭＳ Ｐゴシック" charset="-128"/>
+              </a:defRPr>
+            </a:lvl1pPr>
+            <a:lvl2pPr marL="857250" indent="-857250" algn="l" rtl="0" eaLnBrk="0" fontAlgn="base" hangingPunct="0">
+              <a:spcBef>
+                <a:spcPct val="0"/>
+              </a:spcBef>
+              <a:spcAft>
+                <a:spcPct val="0"/>
+              </a:spcAft>
+              <a:defRPr sz="3300">
+                <a:solidFill>
+                  <a:schemeClr val="tx1"/>
+                </a:solidFill>
+                <a:latin typeface="Bookman Old Style" pitchFamily="18" charset="0"/>
+                <a:ea typeface="ＭＳ Ｐゴシック" charset="-128"/>
+                <a:cs typeface="ＭＳ Ｐゴシック" charset="-128"/>
+              </a:defRPr>
+            </a:lvl2pPr>
+            <a:lvl3pPr marL="857250" indent="-857250" algn="l" rtl="0" eaLnBrk="0" fontAlgn="base" hangingPunct="0">
+              <a:spcBef>
+                <a:spcPct val="0"/>
+              </a:spcBef>
+              <a:spcAft>
+                <a:spcPct val="0"/>
+              </a:spcAft>
+              <a:defRPr sz="3300">
+                <a:solidFill>
+                  <a:schemeClr val="tx1"/>
+                </a:solidFill>
+                <a:latin typeface="Bookman Old Style" pitchFamily="18" charset="0"/>
+                <a:ea typeface="ＭＳ Ｐゴシック" charset="-128"/>
+                <a:cs typeface="ＭＳ Ｐゴシック" charset="-128"/>
+              </a:defRPr>
+            </a:lvl3pPr>
+            <a:lvl4pPr marL="857250" indent="-857250" algn="l" rtl="0" eaLnBrk="0" fontAlgn="base" hangingPunct="0">
+              <a:spcBef>
+                <a:spcPct val="0"/>
+              </a:spcBef>
+              <a:spcAft>
+                <a:spcPct val="0"/>
+              </a:spcAft>
+              <a:defRPr sz="3300">
+                <a:solidFill>
+                  <a:schemeClr val="tx1"/>
+                </a:solidFill>
+                <a:latin typeface="Bookman Old Style" pitchFamily="18" charset="0"/>
+                <a:ea typeface="ＭＳ Ｐゴシック" charset="-128"/>
+                <a:cs typeface="ＭＳ Ｐゴシック" charset="-128"/>
+              </a:defRPr>
+            </a:lvl4pPr>
+            <a:lvl5pPr marL="857250" indent="-857250" algn="l" rtl="0" eaLnBrk="0" fontAlgn="base" hangingPunct="0">
+              <a:spcBef>
+                <a:spcPct val="0"/>
+              </a:spcBef>
+              <a:spcAft>
+                <a:spcPct val="0"/>
+              </a:spcAft>
+              <a:defRPr sz="3300">
+                <a:solidFill>
+                  <a:schemeClr val="tx1"/>
+                </a:solidFill>
+                <a:latin typeface="Bookman Old Style" pitchFamily="18" charset="0"/>
+                <a:ea typeface="ＭＳ Ｐゴシック" charset="-128"/>
+                <a:cs typeface="ＭＳ Ｐゴシック" charset="-128"/>
+              </a:defRPr>
+            </a:lvl5pPr>
+            <a:lvl6pPr marL="1314450" indent="-857250" algn="l" rtl="0" eaLnBrk="0" fontAlgn="base" hangingPunct="0">
+              <a:spcBef>
+                <a:spcPct val="0"/>
+              </a:spcBef>
+              <a:spcAft>
+                <a:spcPct val="0"/>
+              </a:spcAft>
+              <a:defRPr sz="3300">
+                <a:solidFill>
+                  <a:schemeClr val="tx1"/>
+                </a:solidFill>
+                <a:latin typeface="Bookman Old Style" pitchFamily="18" charset="0"/>
+              </a:defRPr>
+            </a:lvl6pPr>
+            <a:lvl7pPr marL="1771650" indent="-857250" algn="l" rtl="0" eaLnBrk="0" fontAlgn="base" hangingPunct="0">
+              <a:spcBef>
+                <a:spcPct val="0"/>
+              </a:spcBef>
+              <a:spcAft>
+                <a:spcPct val="0"/>
+              </a:spcAft>
+              <a:defRPr sz="3300">
+                <a:solidFill>
+                  <a:schemeClr val="tx1"/>
+                </a:solidFill>
+                <a:latin typeface="Bookman Old Style" pitchFamily="18" charset="0"/>
+              </a:defRPr>
+            </a:lvl7pPr>
+            <a:lvl8pPr marL="2228850" indent="-857250" algn="l" rtl="0" eaLnBrk="0" fontAlgn="base" hangingPunct="0">
+              <a:spcBef>
+                <a:spcPct val="0"/>
+              </a:spcBef>
+              <a:spcAft>
+                <a:spcPct val="0"/>
+              </a:spcAft>
+              <a:defRPr sz="3300">
+                <a:solidFill>
+                  <a:schemeClr val="tx1"/>
+                </a:solidFill>
+                <a:latin typeface="Bookman Old Style" pitchFamily="18" charset="0"/>
+              </a:defRPr>
+            </a:lvl8pPr>
+            <a:lvl9pPr marL="2686050" indent="-857250" algn="l" rtl="0" eaLnBrk="0" fontAlgn="base" hangingPunct="0">
+              <a:spcBef>
+                <a:spcPct val="0"/>
+              </a:spcBef>
+              <a:spcAft>
+                <a:spcPct val="0"/>
+              </a:spcAft>
+              <a:defRPr sz="3300">
+                <a:solidFill>
+                  <a:schemeClr val="tx1"/>
+                </a:solidFill>
+                <a:latin typeface="Bookman Old Style" pitchFamily="18" charset="0"/>
+              </a:defRPr>
+            </a:lvl9pPr>
+          </a:lstStyle>
+          <a:p>
+            <a:r>
+              <a:rPr lang="en-US" sz="2000" dirty="0" smtClean="0"/>
+              <a:t>Our approach</a:t>
+            </a:r>
+            <a:endParaRPr lang="en-US" sz="2000" dirty="0"/>
+          </a:p>
+        </p:txBody>
+      </p:sp>
+    </p:spTree>
+    <p:extLst>
+      <p:ext uri="{BB962C8B-B14F-4D97-AF65-F5344CB8AC3E}">
+        <p14:creationId xmlns:p14="http://schemas.microsoft.com/office/powerpoint/2010/main" val="1204971704"/>
+      </p:ext>
+    </p:extLst>
+  </p:cSld>
+  <p:clrMapOvr>
+    <a:masterClrMapping/>
+  </p:clrMapOvr>
+  <p:timing>
+    <p:tnLst>
+      <p:par>
+        <p:cTn id="1" dur="indefinite" restart="never" nodeType="tmRoot"/>
+      </p:par>
+    </p:tnLst>
+  </p:timing>
+</p:sld>
+</file>
+
+<file path=ppt/slides/slide7.xml><?xml version="1.0" encoding="utf-8"?>
+<p:sld xmlns:a="http://schemas.openxmlformats.org/drawingml/2006/main" xmlns:r="http://schemas.openxmlformats.org/officeDocument/2006/relationships" xmlns:p="http://schemas.openxmlformats.org/presentationml/2006/main">
+  <p:cSld>
+    <p:spTree>
+      <p:nvGrpSpPr>
+        <p:cNvPr id="1" name=""/>
+        <p:cNvGrpSpPr/>
+        <p:nvPr/>
+      </p:nvGrpSpPr>
+      <p:grpSpPr>
+        <a:xfrm>
+          <a:off x="0" y="0"/>
+          <a:ext cx="0" cy="0"/>
+          <a:chOff x="0" y="0"/>
+          <a:chExt cx="0" cy="0"/>
+        </a:xfrm>
+      </p:grpSpPr>
+      <p:sp>
+        <p:nvSpPr>
+          <p:cNvPr id="2" name="Title 1"/>
+          <p:cNvSpPr>
+            <a:spLocks noGrp="1"/>
+          </p:cNvSpPr>
+          <p:nvPr>
+            <p:ph type="title"/>
+          </p:nvPr>
+        </p:nvSpPr>
+        <p:spPr/>
+        <p:txBody>
+          <a:bodyPr/>
+          <a:lstStyle/>
+          <a:p>
+            <a:r>
+              <a:rPr lang="en-US" dirty="0" smtClean="0"/>
+              <a:t>Controlling KITT</a:t>
+            </a:r>
+            <a:endParaRPr lang="en-US" dirty="0"/>
+          </a:p>
+        </p:txBody>
+      </p:sp>
+      <p:sp>
+        <p:nvSpPr>
+          <p:cNvPr id="6" name="Title 1"/>
+          <p:cNvSpPr txBox="1">
+            <a:spLocks/>
+          </p:cNvSpPr>
+          <p:nvPr/>
+        </p:nvSpPr>
+        <p:spPr bwMode="auto">
+          <a:xfrm>
+            <a:off x="948296" y="1096334"/>
+            <a:ext cx="7159625" cy="470340"/>
+          </a:xfrm>
+          <a:prstGeom prst="rect">
+            <a:avLst/>
+          </a:prstGeom>
+          <a:noFill/>
+          <a:ln>
+            <a:noFill/>
+          </a:ln>
+          <a:extLst>
+            <a:ext uri="{909E8E84-426E-40DD-AFC4-6F175D3DCCD1}">
+              <a14:hiddenFill xmlns:a14="http://schemas.microsoft.com/office/drawing/2010/main">
+                <a:solidFill>
+                  <a:srgbClr val="FFFFFF"/>
+                </a:solidFill>
+              </a14:hiddenFill>
+            </a:ext>
+            <a:ext uri="{91240B29-F687-4F45-9708-019B960494DF}">
+              <a14:hiddenLine xmlns:a14="http://schemas.microsoft.com/office/drawing/2010/main" w="9525">
+                <a:solidFill>
+                  <a:srgbClr val="000000"/>
+                </a:solidFill>
+                <a:miter lim="800000"/>
+                <a:headEnd/>
+                <a:tailEnd/>
+              </a14:hiddenLine>
+            </a:ext>
+          </a:extLst>
+        </p:spPr>
+        <p:txBody>
+          <a:bodyPr vert="horz" wrap="square" lIns="0" tIns="0" rIns="0" bIns="0" numCol="1" anchor="t" anchorCtr="0" compatLnSpc="1">
+            <a:prstTxWarp prst="textNoShape">
+              <a:avLst/>
+            </a:prstTxWarp>
+          </a:bodyPr>
+          <a:lstStyle>
+            <a:lvl1pPr marL="857250" indent="-857250" algn="l" rtl="0" eaLnBrk="0" fontAlgn="base" hangingPunct="0">
+              <a:spcBef>
+                <a:spcPct val="0"/>
+              </a:spcBef>
+              <a:spcAft>
+                <a:spcPct val="0"/>
+              </a:spcAft>
+              <a:defRPr sz="3300">
+                <a:solidFill>
+                  <a:schemeClr val="tx1"/>
+                </a:solidFill>
+                <a:latin typeface="+mj-lt"/>
+                <a:ea typeface="ＭＳ Ｐゴシック" charset="-128"/>
+                <a:cs typeface="ＭＳ Ｐゴシック" charset="-128"/>
+              </a:defRPr>
+            </a:lvl1pPr>
+            <a:lvl2pPr marL="857250" indent="-857250" algn="l" rtl="0" eaLnBrk="0" fontAlgn="base" hangingPunct="0">
+              <a:spcBef>
+                <a:spcPct val="0"/>
+              </a:spcBef>
+              <a:spcAft>
+                <a:spcPct val="0"/>
+              </a:spcAft>
+              <a:defRPr sz="3300">
+                <a:solidFill>
+                  <a:schemeClr val="tx1"/>
+                </a:solidFill>
+                <a:latin typeface="Bookman Old Style" pitchFamily="18" charset="0"/>
+                <a:ea typeface="ＭＳ Ｐゴシック" charset="-128"/>
+                <a:cs typeface="ＭＳ Ｐゴシック" charset="-128"/>
+              </a:defRPr>
+            </a:lvl2pPr>
+            <a:lvl3pPr marL="857250" indent="-857250" algn="l" rtl="0" eaLnBrk="0" fontAlgn="base" hangingPunct="0">
+              <a:spcBef>
+                <a:spcPct val="0"/>
+              </a:spcBef>
+              <a:spcAft>
+                <a:spcPct val="0"/>
+              </a:spcAft>
+              <a:defRPr sz="3300">
+                <a:solidFill>
+                  <a:schemeClr val="tx1"/>
+                </a:solidFill>
+                <a:latin typeface="Bookman Old Style" pitchFamily="18" charset="0"/>
+                <a:ea typeface="ＭＳ Ｐゴシック" charset="-128"/>
+                <a:cs typeface="ＭＳ Ｐゴシック" charset="-128"/>
+              </a:defRPr>
+            </a:lvl3pPr>
+            <a:lvl4pPr marL="857250" indent="-857250" algn="l" rtl="0" eaLnBrk="0" fontAlgn="base" hangingPunct="0">
+              <a:spcBef>
+                <a:spcPct val="0"/>
+              </a:spcBef>
+              <a:spcAft>
+                <a:spcPct val="0"/>
+              </a:spcAft>
+              <a:defRPr sz="3300">
+                <a:solidFill>
+                  <a:schemeClr val="tx1"/>
+                </a:solidFill>
+                <a:latin typeface="Bookman Old Style" pitchFamily="18" charset="0"/>
+                <a:ea typeface="ＭＳ Ｐゴシック" charset="-128"/>
+                <a:cs typeface="ＭＳ Ｐゴシック" charset="-128"/>
+              </a:defRPr>
+            </a:lvl4pPr>
+            <a:lvl5pPr marL="857250" indent="-857250" algn="l" rtl="0" eaLnBrk="0" fontAlgn="base" hangingPunct="0">
+              <a:spcBef>
+                <a:spcPct val="0"/>
+              </a:spcBef>
+              <a:spcAft>
+                <a:spcPct val="0"/>
+              </a:spcAft>
+              <a:defRPr sz="3300">
+                <a:solidFill>
+                  <a:schemeClr val="tx1"/>
+                </a:solidFill>
+                <a:latin typeface="Bookman Old Style" pitchFamily="18" charset="0"/>
+                <a:ea typeface="ＭＳ Ｐゴシック" charset="-128"/>
+                <a:cs typeface="ＭＳ Ｐゴシック" charset="-128"/>
+              </a:defRPr>
+            </a:lvl5pPr>
+            <a:lvl6pPr marL="1314450" indent="-857250" algn="l" rtl="0" eaLnBrk="0" fontAlgn="base" hangingPunct="0">
+              <a:spcBef>
+                <a:spcPct val="0"/>
+              </a:spcBef>
+              <a:spcAft>
+                <a:spcPct val="0"/>
+              </a:spcAft>
+              <a:defRPr sz="3300">
+                <a:solidFill>
+                  <a:schemeClr val="tx1"/>
+                </a:solidFill>
+                <a:latin typeface="Bookman Old Style" pitchFamily="18" charset="0"/>
+              </a:defRPr>
+            </a:lvl6pPr>
+            <a:lvl7pPr marL="1771650" indent="-857250" algn="l" rtl="0" eaLnBrk="0" fontAlgn="base" hangingPunct="0">
+              <a:spcBef>
+                <a:spcPct val="0"/>
+              </a:spcBef>
+              <a:spcAft>
+                <a:spcPct val="0"/>
+              </a:spcAft>
+              <a:defRPr sz="3300">
+                <a:solidFill>
+                  <a:schemeClr val="tx1"/>
+                </a:solidFill>
+                <a:latin typeface="Bookman Old Style" pitchFamily="18" charset="0"/>
+              </a:defRPr>
+            </a:lvl7pPr>
+            <a:lvl8pPr marL="2228850" indent="-857250" algn="l" rtl="0" eaLnBrk="0" fontAlgn="base" hangingPunct="0">
+              <a:spcBef>
+                <a:spcPct val="0"/>
+              </a:spcBef>
+              <a:spcAft>
+                <a:spcPct val="0"/>
+              </a:spcAft>
+              <a:defRPr sz="3300">
+                <a:solidFill>
+                  <a:schemeClr val="tx1"/>
+                </a:solidFill>
+                <a:latin typeface="Bookman Old Style" pitchFamily="18" charset="0"/>
+              </a:defRPr>
+            </a:lvl8pPr>
+            <a:lvl9pPr marL="2686050" indent="-857250" algn="l" rtl="0" eaLnBrk="0" fontAlgn="base" hangingPunct="0">
+              <a:spcBef>
+                <a:spcPct val="0"/>
+              </a:spcBef>
+              <a:spcAft>
+                <a:spcPct val="0"/>
+              </a:spcAft>
+              <a:defRPr sz="3300">
+                <a:solidFill>
+                  <a:schemeClr val="tx1"/>
+                </a:solidFill>
+                <a:latin typeface="Bookman Old Style" pitchFamily="18" charset="0"/>
+              </a:defRPr>
+            </a:lvl9pPr>
+          </a:lstStyle>
+          <a:p>
+            <a:r>
+              <a:rPr lang="en-US" sz="2000" dirty="0" smtClean="0"/>
+              <a:t>System overview</a:t>
+            </a:r>
+            <a:endParaRPr lang="en-US" sz="2000" dirty="0"/>
+          </a:p>
+        </p:txBody>
+      </p:sp>
+      <p:pic>
+        <p:nvPicPr>
+          <p:cNvPr id="3" name="Picture 2" descr="control-overview.pdf"/>
+          <p:cNvPicPr>
+            <a:picLocks noChangeAspect="1"/>
+          </p:cNvPicPr>
+          <p:nvPr/>
+        </p:nvPicPr>
+        <p:blipFill>
+          <a:blip r:embed="rId2">
+            <a:extLst>
+              <a:ext uri="{28A0092B-C50C-407E-A947-70E740481C1C}">
+                <a14:useLocalDpi xmlns:a14="http://schemas.microsoft.com/office/drawing/2010/main" val="0"/>
+              </a:ext>
+            </a:extLst>
+          </a:blip>
+          <a:stretch>
+            <a:fillRect/>
+          </a:stretch>
+        </p:blipFill>
+        <p:spPr>
+          <a:xfrm>
+            <a:off x="600791" y="2192698"/>
+            <a:ext cx="8085481" cy="3073214"/>
+          </a:xfrm>
+          <a:prstGeom prst="rect">
+            <a:avLst/>
+          </a:prstGeom>
+        </p:spPr>
+      </p:pic>
+    </p:spTree>
+    <p:extLst>
+      <p:ext uri="{BB962C8B-B14F-4D97-AF65-F5344CB8AC3E}">
+        <p14:creationId xmlns:p14="http://schemas.microsoft.com/office/powerpoint/2010/main" val="547937933"/>
+      </p:ext>
+    </p:extLst>
+  </p:cSld>
+  <p:clrMapOvr>
+    <a:masterClrMapping/>
+  </p:clrMapOvr>
+  <p:timing>
+    <p:tnLst>
+      <p:par>
+        <p:cTn id="1" dur="indefinite" restart="never" nodeType="tmRoot"/>
+      </p:par>
+    </p:tnLst>
+  </p:timing>
+</p:sld>
+</file>
+
+<file path=ppt/slides/slide8.xml><?xml version="1.0" encoding="utf-8"?>
+<p:sld xmlns:a="http://schemas.openxmlformats.org/drawingml/2006/main" xmlns:r="http://schemas.openxmlformats.org/officeDocument/2006/relationships" xmlns:p="http://schemas.openxmlformats.org/presentationml/2006/main">
+  <p:cSld>
+    <p:spTree>
+      <p:nvGrpSpPr>
+        <p:cNvPr id="1" name=""/>
+        <p:cNvGrpSpPr/>
+        <p:nvPr/>
+      </p:nvGrpSpPr>
+      <p:grpSpPr>
+        <a:xfrm>
+          <a:off x="0" y="0"/>
+          <a:ext cx="0" cy="0"/>
+          <a:chOff x="0" y="0"/>
+          <a:chExt cx="0" cy="0"/>
+        </a:xfrm>
+      </p:grpSpPr>
+      <p:sp>
+        <p:nvSpPr>
+          <p:cNvPr id="2" name="Titel 1"/>
+          <p:cNvSpPr>
+            <a:spLocks noGrp="1"/>
+          </p:cNvSpPr>
+          <p:nvPr>
+            <p:ph type="title"/>
+          </p:nvPr>
+        </p:nvSpPr>
+        <p:spPr/>
+        <p:txBody>
+          <a:bodyPr/>
+          <a:lstStyle/>
+          <a:p>
+            <a:r>
+              <a:rPr lang="nl-NL" dirty="0" smtClean="0"/>
+              <a:t>GUI &amp; Communication</a:t>
+            </a:r>
+            <a:endParaRPr lang="nl-NL" dirty="0"/>
+          </a:p>
+        </p:txBody>
+      </p:sp>
+      <p:graphicFrame>
+        <p:nvGraphicFramePr>
+          <p:cNvPr id="4" name="Object 3"/>
+          <p:cNvGraphicFramePr>
+            <a:graphicFrameLocks noChangeAspect="1"/>
+          </p:cNvGraphicFramePr>
+          <p:nvPr>
+            <p:extLst>
+              <p:ext uri="{D42A27DB-BD31-4B8C-83A1-F6EECF244321}">
+                <p14:modId xmlns:p14="http://schemas.microsoft.com/office/powerpoint/2010/main" val="2887956073"/>
+              </p:ext>
+            </p:extLst>
+          </p:nvPr>
+        </p:nvGraphicFramePr>
+        <p:xfrm>
+          <a:off x="1285336" y="1202609"/>
+          <a:ext cx="6978770" cy="4792534"/>
+        </p:xfrm>
+        <a:graphic>
+          <a:graphicData uri="http://schemas.openxmlformats.org/presentationml/2006/ole">
+            <mc:AlternateContent xmlns:mc="http://schemas.openxmlformats.org/markup-compatibility/2006">
+              <mc:Choice xmlns:v="urn:schemas-microsoft-com:vml" Requires="v">
+                <p:oleObj spid="_x0000_s2051" name="Visio" r:id="rId3" imgW="6962804" imgH="4781526" progId="Visio.Drawing.15">
+                  <p:embed/>
+                </p:oleObj>
+              </mc:Choice>
+              <mc:Fallback>
+                <p:oleObj name="Visio" r:id="rId3" imgW="6962804" imgH="4781526" progId="Visio.Drawing.15">
+                  <p:embed/>
+                  <p:pic>
+                    <p:nvPicPr>
+                      <p:cNvPr id="0" name=""/>
+                      <p:cNvPicPr/>
+                      <p:nvPr/>
+                    </p:nvPicPr>
+                    <p:blipFill>
+                      <a:blip r:embed="rId4"/>
+                      <a:stretch>
+                        <a:fillRect/>
+                      </a:stretch>
+                    </p:blipFill>
+                    <p:spPr>
+                      <a:xfrm>
+                        <a:off x="1285336" y="1202609"/>
+                        <a:ext cx="6978770" cy="4792534"/>
+                      </a:xfrm>
+                      <a:prstGeom prst="rect">
+                        <a:avLst/>
+                      </a:prstGeom>
+                    </p:spPr>
+                  </p:pic>
+                </p:oleObj>
+              </mc:Fallback>
+            </mc:AlternateContent>
+          </a:graphicData>
+        </a:graphic>
+      </p:graphicFrame>
+      <p:sp>
+        <p:nvSpPr>
+          <p:cNvPr id="5" name="Title 1"/>
+          <p:cNvSpPr txBox="1">
+            <a:spLocks/>
+          </p:cNvSpPr>
+          <p:nvPr/>
+        </p:nvSpPr>
+        <p:spPr bwMode="auto">
+          <a:xfrm>
+            <a:off x="948296" y="1096334"/>
+            <a:ext cx="7159625" cy="470340"/>
+          </a:xfrm>
+          <a:prstGeom prst="rect">
+            <a:avLst/>
+          </a:prstGeom>
+          <a:noFill/>
+          <a:ln>
+            <a:noFill/>
+          </a:ln>
+          <a:extLst>
+            <a:ext uri="{909E8E84-426E-40DD-AFC4-6F175D3DCCD1}">
+              <a14:hiddenFill xmlns:a14="http://schemas.microsoft.com/office/drawing/2010/main">
+                <a:solidFill>
+                  <a:srgbClr val="FFFFFF"/>
+                </a:solidFill>
+              </a14:hiddenFill>
+            </a:ext>
+            <a:ext uri="{91240B29-F687-4F45-9708-019B960494DF}">
+              <a14:hiddenLine xmlns:a14="http://schemas.microsoft.com/office/drawing/2010/main" w="9525">
+                <a:solidFill>
+                  <a:srgbClr val="000000"/>
+                </a:solidFill>
+                <a:miter lim="800000"/>
+                <a:headEnd/>
+                <a:tailEnd/>
+              </a14:hiddenLine>
+            </a:ext>
+          </a:extLst>
+        </p:spPr>
+        <p:txBody>
+          <a:bodyPr vert="horz" wrap="square" lIns="0" tIns="0" rIns="0" bIns="0" numCol="1" anchor="t" anchorCtr="0" compatLnSpc="1">
+            <a:prstTxWarp prst="textNoShape">
+              <a:avLst/>
+            </a:prstTxWarp>
+          </a:bodyPr>
+          <a:lstStyle>
+            <a:lvl1pPr marL="857250" indent="-857250" algn="l" rtl="0" eaLnBrk="0" fontAlgn="base" hangingPunct="0">
+              <a:spcBef>
+                <a:spcPct val="0"/>
+              </a:spcBef>
+              <a:spcAft>
+                <a:spcPct val="0"/>
+              </a:spcAft>
+              <a:defRPr sz="3300">
+                <a:solidFill>
+                  <a:schemeClr val="tx1"/>
+                </a:solidFill>
+                <a:latin typeface="+mj-lt"/>
+                <a:ea typeface="ＭＳ Ｐゴシック" charset="-128"/>
+                <a:cs typeface="ＭＳ Ｐゴシック" charset="-128"/>
+              </a:defRPr>
+            </a:lvl1pPr>
+            <a:lvl2pPr marL="857250" indent="-857250" algn="l" rtl="0" eaLnBrk="0" fontAlgn="base" hangingPunct="0">
+              <a:spcBef>
+                <a:spcPct val="0"/>
+              </a:spcBef>
+              <a:spcAft>
+                <a:spcPct val="0"/>
+              </a:spcAft>
+              <a:defRPr sz="3300">
+                <a:solidFill>
+                  <a:schemeClr val="tx1"/>
+                </a:solidFill>
+                <a:latin typeface="Bookman Old Style" pitchFamily="18" charset="0"/>
+                <a:ea typeface="ＭＳ Ｐゴシック" charset="-128"/>
+                <a:cs typeface="ＭＳ Ｐゴシック" charset="-128"/>
+              </a:defRPr>
+            </a:lvl2pPr>
+            <a:lvl3pPr marL="857250" indent="-857250" algn="l" rtl="0" eaLnBrk="0" fontAlgn="base" hangingPunct="0">
+              <a:spcBef>
+                <a:spcPct val="0"/>
+              </a:spcBef>
+              <a:spcAft>
+                <a:spcPct val="0"/>
+              </a:spcAft>
+              <a:defRPr sz="3300">
+                <a:solidFill>
+                  <a:schemeClr val="tx1"/>
+                </a:solidFill>
+                <a:latin typeface="Bookman Old Style" pitchFamily="18" charset="0"/>
+                <a:ea typeface="ＭＳ Ｐゴシック" charset="-128"/>
+                <a:cs typeface="ＭＳ Ｐゴシック" charset="-128"/>
+              </a:defRPr>
+            </a:lvl3pPr>
+            <a:lvl4pPr marL="857250" indent="-857250" algn="l" rtl="0" eaLnBrk="0" fontAlgn="base" hangingPunct="0">
+              <a:spcBef>
+                <a:spcPct val="0"/>
+              </a:spcBef>
+              <a:spcAft>
+                <a:spcPct val="0"/>
+              </a:spcAft>
+              <a:defRPr sz="3300">
+                <a:solidFill>
+                  <a:schemeClr val="tx1"/>
+                </a:solidFill>
+                <a:latin typeface="Bookman Old Style" pitchFamily="18" charset="0"/>
+                <a:ea typeface="ＭＳ Ｐゴシック" charset="-128"/>
+                <a:cs typeface="ＭＳ Ｐゴシック" charset="-128"/>
+              </a:defRPr>
+            </a:lvl4pPr>
+            <a:lvl5pPr marL="857250" indent="-857250" algn="l" rtl="0" eaLnBrk="0" fontAlgn="base" hangingPunct="0">
+              <a:spcBef>
+                <a:spcPct val="0"/>
+              </a:spcBef>
+              <a:spcAft>
+                <a:spcPct val="0"/>
+              </a:spcAft>
+              <a:defRPr sz="3300">
+                <a:solidFill>
+                  <a:schemeClr val="tx1"/>
+                </a:solidFill>
+                <a:latin typeface="Bookman Old Style" pitchFamily="18" charset="0"/>
+                <a:ea typeface="ＭＳ Ｐゴシック" charset="-128"/>
+                <a:cs typeface="ＭＳ Ｐゴシック" charset="-128"/>
+              </a:defRPr>
+            </a:lvl5pPr>
+            <a:lvl6pPr marL="1314450" indent="-857250" algn="l" rtl="0" eaLnBrk="0" fontAlgn="base" hangingPunct="0">
+              <a:spcBef>
+                <a:spcPct val="0"/>
+              </a:spcBef>
+              <a:spcAft>
+                <a:spcPct val="0"/>
+              </a:spcAft>
+              <a:defRPr sz="3300">
+                <a:solidFill>
+                  <a:schemeClr val="tx1"/>
+                </a:solidFill>
+                <a:latin typeface="Bookman Old Style" pitchFamily="18" charset="0"/>
+              </a:defRPr>
+            </a:lvl6pPr>
+            <a:lvl7pPr marL="1771650" indent="-857250" algn="l" rtl="0" eaLnBrk="0" fontAlgn="base" hangingPunct="0">
+              <a:spcBef>
+                <a:spcPct val="0"/>
+              </a:spcBef>
+              <a:spcAft>
+                <a:spcPct val="0"/>
+              </a:spcAft>
+              <a:defRPr sz="3300">
+                <a:solidFill>
+                  <a:schemeClr val="tx1"/>
+                </a:solidFill>
+                <a:latin typeface="Bookman Old Style" pitchFamily="18" charset="0"/>
+              </a:defRPr>
+            </a:lvl7pPr>
+            <a:lvl8pPr marL="2228850" indent="-857250" algn="l" rtl="0" eaLnBrk="0" fontAlgn="base" hangingPunct="0">
+              <a:spcBef>
+                <a:spcPct val="0"/>
+              </a:spcBef>
+              <a:spcAft>
+                <a:spcPct val="0"/>
+              </a:spcAft>
+              <a:defRPr sz="3300">
+                <a:solidFill>
+                  <a:schemeClr val="tx1"/>
+                </a:solidFill>
+                <a:latin typeface="Bookman Old Style" pitchFamily="18" charset="0"/>
+              </a:defRPr>
+            </a:lvl8pPr>
+            <a:lvl9pPr marL="2686050" indent="-857250" algn="l" rtl="0" eaLnBrk="0" fontAlgn="base" hangingPunct="0">
+              <a:spcBef>
+                <a:spcPct val="0"/>
+              </a:spcBef>
+              <a:spcAft>
+                <a:spcPct val="0"/>
+              </a:spcAft>
+              <a:defRPr sz="3300">
+                <a:solidFill>
+                  <a:schemeClr val="tx1"/>
+                </a:solidFill>
+                <a:latin typeface="Bookman Old Style" pitchFamily="18" charset="0"/>
+              </a:defRPr>
+            </a:lvl9pPr>
+          </a:lstStyle>
+          <a:p>
+            <a:r>
+              <a:rPr lang="en-US" sz="2000" dirty="0" smtClean="0"/>
+              <a:t>System overview</a:t>
+            </a:r>
+          </a:p>
+        </p:txBody>
+      </p:sp>
+    </p:spTree>
+    <p:extLst>
+      <p:ext uri="{BB962C8B-B14F-4D97-AF65-F5344CB8AC3E}">
+        <p14:creationId xmlns:p14="http://schemas.microsoft.com/office/powerpoint/2010/main" val="1007438270"/>
+      </p:ext>
+    </p:extLst>
+  </p:cSld>
+  <p:clrMapOvr>
+    <a:masterClrMapping/>
+  </p:clrMapOvr>
+  <mc:AlternateContent xmlns:mc="http://schemas.openxmlformats.org/markup-compatibility/2006" xmlns:p14="http://schemas.microsoft.com/office/powerpoint/2010/main">
+    <mc:Choice Requires="p14">
+      <p:transition p14:dur="10"/>
+    </mc:Choice>
+    <mc:Fallback xmlns="">
+      <p:transition/>
+    </mc:Fallback>
+  </mc:AlternateContent>
+  <p:timing>
+    <p:tnLst>
+      <p:par>
+        <p:cTn id="1" dur="indefinite" restart="never" nodeType="tmRoot"/>
+      </p:par>
+    </p:tnLst>
+  </p:timing>
+</p:sld>
+</file>
+
+<file path=ppt/slides/slide9.xml><?xml version="1.0" encoding="utf-8"?>
+<p:sld xmlns:a="http://schemas.openxmlformats.org/drawingml/2006/main" xmlns:r="http://schemas.openxmlformats.org/officeDocument/2006/relationships" xmlns:p="http://schemas.openxmlformats.org/presentationml/2006/main">
+  <p:cSld>
+    <p:spTree>
+      <p:nvGrpSpPr>
+        <p:cNvPr id="1" name=""/>
+        <p:cNvGrpSpPr/>
+        <p:nvPr/>
+      </p:nvGrpSpPr>
+      <p:grpSpPr>
+        <a:xfrm>
+          <a:off x="0" y="0"/>
+          <a:ext cx="0" cy="0"/>
+          <a:chOff x="0" y="0"/>
+          <a:chExt cx="0" cy="0"/>
+        </a:xfrm>
+      </p:grpSpPr>
+      <p:sp>
+        <p:nvSpPr>
+          <p:cNvPr id="2" name="Titel 1"/>
+          <p:cNvSpPr>
+            <a:spLocks noGrp="1"/>
+          </p:cNvSpPr>
+          <p:nvPr>
+            <p:ph type="title"/>
+          </p:nvPr>
+        </p:nvSpPr>
+        <p:spPr/>
+        <p:txBody>
+          <a:bodyPr/>
+          <a:lstStyle/>
+          <a:p>
+            <a:r>
+              <a:rPr lang="nl-NL" dirty="0" smtClean="0"/>
+              <a:t>GUI &amp; Communication</a:t>
+            </a:r>
+            <a:endParaRPr lang="nl-NL" dirty="0"/>
+          </a:p>
+        </p:txBody>
+      </p:sp>
+      <p:pic>
+        <p:nvPicPr>
+          <p:cNvPr id="2051" name="Picture 3"/>
+          <p:cNvPicPr>
+            <a:picLocks noChangeAspect="1" noChangeArrowheads="1"/>
+          </p:cNvPicPr>
+          <p:nvPr/>
+        </p:nvPicPr>
+        <p:blipFill>
+          <a:blip r:embed="rId2">
+            <a:extLst>
+              <a:ext uri="{28A0092B-C50C-407E-A947-70E740481C1C}">
+                <a14:useLocalDpi xmlns:a14="http://schemas.microsoft.com/office/drawing/2010/main" val="0"/>
+              </a:ext>
+            </a:extLst>
+          </a:blip>
+          <a:srcRect/>
+          <a:stretch>
+            <a:fillRect/>
+          </a:stretch>
+        </p:blipFill>
+        <p:spPr bwMode="auto">
+          <a:xfrm>
+            <a:off x="1552238" y="1791048"/>
+            <a:ext cx="6039523" cy="4000500"/>
+          </a:xfrm>
+          <a:prstGeom prst="rect">
+            <a:avLst/>
+          </a:prstGeom>
+          <a:noFill/>
+          <a:ln>
+            <a:noFill/>
+          </a:ln>
+          <a:extLst>
+            <a:ext uri="{909E8E84-426E-40DD-AFC4-6F175D3DCCD1}">
+              <a14:hiddenFill xmlns:a14="http://schemas.microsoft.com/office/drawing/2010/main">
+                <a:solidFill>
+                  <a:schemeClr val="accent1"/>
+                </a:solidFill>
+              </a14:hiddenFill>
+            </a:ext>
+            <a:ext uri="{91240B29-F687-4F45-9708-019B960494DF}">
+              <a14:hiddenLine xmlns:a14="http://schemas.microsoft.com/office/drawing/2010/main" w="9525">
+                <a:solidFill>
+                  <a:schemeClr val="tx1"/>
+                </a:solidFill>
+                <a:miter lim="800000"/>
+                <a:headEnd/>
+                <a:tailEnd/>
+              </a14:hiddenLine>
+            </a:ext>
+          </a:extLst>
+        </p:spPr>
+      </p:pic>
+      <p:sp>
+        <p:nvSpPr>
+          <p:cNvPr id="5" name="Title 1"/>
+          <p:cNvSpPr txBox="1">
+            <a:spLocks/>
+          </p:cNvSpPr>
+          <p:nvPr/>
+        </p:nvSpPr>
+        <p:spPr bwMode="auto">
+          <a:xfrm>
+            <a:off x="948296" y="1096334"/>
+            <a:ext cx="7159625" cy="470340"/>
+          </a:xfrm>
+          <a:prstGeom prst="rect">
+            <a:avLst/>
+          </a:prstGeom>
+          <a:noFill/>
+          <a:ln>
+            <a:noFill/>
+          </a:ln>
+          <a:extLst>
+            <a:ext uri="{909E8E84-426E-40DD-AFC4-6F175D3DCCD1}">
+              <a14:hiddenFill xmlns:a14="http://schemas.microsoft.com/office/drawing/2010/main">
+                <a:solidFill>
+                  <a:srgbClr val="FFFFFF"/>
+                </a:solidFill>
+              </a14:hiddenFill>
+            </a:ext>
+            <a:ext uri="{91240B29-F687-4F45-9708-019B960494DF}">
+              <a14:hiddenLine xmlns:a14="http://schemas.microsoft.com/office/drawing/2010/main" w="9525">
+                <a:solidFill>
+                  <a:srgbClr val="000000"/>
+                </a:solidFill>
+                <a:miter lim="800000"/>
+                <a:headEnd/>
+                <a:tailEnd/>
+              </a14:hiddenLine>
+            </a:ext>
+          </a:extLst>
+        </p:spPr>
+        <p:txBody>
+          <a:bodyPr vert="horz" wrap="square" lIns="0" tIns="0" rIns="0" bIns="0" numCol="1" anchor="t" anchorCtr="0" compatLnSpc="1">
+            <a:prstTxWarp prst="textNoShape">
+              <a:avLst/>
+            </a:prstTxWarp>
+          </a:bodyPr>
+          <a:lstStyle>
+            <a:lvl1pPr marL="857250" indent="-857250" algn="l" rtl="0" eaLnBrk="0" fontAlgn="base" hangingPunct="0">
+              <a:spcBef>
+                <a:spcPct val="0"/>
+              </a:spcBef>
+              <a:spcAft>
+                <a:spcPct val="0"/>
+              </a:spcAft>
+              <a:defRPr sz="3300">
+                <a:solidFill>
+                  <a:schemeClr val="tx1"/>
+                </a:solidFill>
+                <a:latin typeface="+mj-lt"/>
+                <a:ea typeface="ＭＳ Ｐゴシック" charset="-128"/>
+                <a:cs typeface="ＭＳ Ｐゴシック" charset="-128"/>
+              </a:defRPr>
+            </a:lvl1pPr>
+            <a:lvl2pPr marL="857250" indent="-857250" algn="l" rtl="0" eaLnBrk="0" fontAlgn="base" hangingPunct="0">
+              <a:spcBef>
+                <a:spcPct val="0"/>
+              </a:spcBef>
+              <a:spcAft>
+                <a:spcPct val="0"/>
+              </a:spcAft>
+              <a:defRPr sz="3300">
+                <a:solidFill>
+                  <a:schemeClr val="tx1"/>
+                </a:solidFill>
+                <a:latin typeface="Bookman Old Style" pitchFamily="18" charset="0"/>
+                <a:ea typeface="ＭＳ Ｐゴシック" charset="-128"/>
+                <a:cs typeface="ＭＳ Ｐゴシック" charset="-128"/>
+              </a:defRPr>
+            </a:lvl2pPr>
+            <a:lvl3pPr marL="857250" indent="-857250" algn="l" rtl="0" eaLnBrk="0" fontAlgn="base" hangingPunct="0">
+              <a:spcBef>
+                <a:spcPct val="0"/>
+              </a:spcBef>
+              <a:spcAft>
+                <a:spcPct val="0"/>
+              </a:spcAft>
+              <a:defRPr sz="3300">
+                <a:solidFill>
+                  <a:schemeClr val="tx1"/>
+                </a:solidFill>
+                <a:latin typeface="Bookman Old Style" pitchFamily="18" charset="0"/>
+                <a:ea typeface="ＭＳ Ｐゴシック" charset="-128"/>
+                <a:cs typeface="ＭＳ Ｐゴシック" charset="-128"/>
+              </a:defRPr>
+            </a:lvl3pPr>
+            <a:lvl4pPr marL="857250" indent="-857250" algn="l" rtl="0" eaLnBrk="0" fontAlgn="base" hangingPunct="0">
+              <a:spcBef>
+                <a:spcPct val="0"/>
+              </a:spcBef>
+              <a:spcAft>
+                <a:spcPct val="0"/>
+              </a:spcAft>
+              <a:defRPr sz="3300">
+                <a:solidFill>
+                  <a:schemeClr val="tx1"/>
+                </a:solidFill>
+                <a:latin typeface="Bookman Old Style" pitchFamily="18" charset="0"/>
+                <a:ea typeface="ＭＳ Ｐゴシック" charset="-128"/>
+                <a:cs typeface="ＭＳ Ｐゴシック" charset="-128"/>
+              </a:defRPr>
+            </a:lvl4pPr>
+            <a:lvl5pPr marL="857250" indent="-857250" algn="l" rtl="0" eaLnBrk="0" fontAlgn="base" hangingPunct="0">
+              <a:spcBef>
+                <a:spcPct val="0"/>
+              </a:spcBef>
+              <a:spcAft>
+                <a:spcPct val="0"/>
+              </a:spcAft>
+              <a:defRPr sz="3300">
+                <a:solidFill>
+                  <a:schemeClr val="tx1"/>
+                </a:solidFill>
+                <a:latin typeface="Bookman Old Style" pitchFamily="18" charset="0"/>
+                <a:ea typeface="ＭＳ Ｐゴシック" charset="-128"/>
+                <a:cs typeface="ＭＳ Ｐゴシック" charset="-128"/>
+              </a:defRPr>
+            </a:lvl5pPr>
+            <a:lvl6pPr marL="1314450" indent="-857250" algn="l" rtl="0" eaLnBrk="0" fontAlgn="base" hangingPunct="0">
+              <a:spcBef>
+                <a:spcPct val="0"/>
+              </a:spcBef>
+              <a:spcAft>
+                <a:spcPct val="0"/>
+              </a:spcAft>
+              <a:defRPr sz="3300">
+                <a:solidFill>
+                  <a:schemeClr val="tx1"/>
+                </a:solidFill>
+                <a:latin typeface="Bookman Old Style" pitchFamily="18" charset="0"/>
+              </a:defRPr>
+            </a:lvl6pPr>
+            <a:lvl7pPr marL="1771650" indent="-857250" algn="l" rtl="0" eaLnBrk="0" fontAlgn="base" hangingPunct="0">
+              <a:spcBef>
+                <a:spcPct val="0"/>
+              </a:spcBef>
+              <a:spcAft>
+                <a:spcPct val="0"/>
+              </a:spcAft>
+              <a:defRPr sz="3300">
+                <a:solidFill>
+                  <a:schemeClr val="tx1"/>
+                </a:solidFill>
+                <a:latin typeface="Bookman Old Style" pitchFamily="18" charset="0"/>
+              </a:defRPr>
+            </a:lvl7pPr>
+            <a:lvl8pPr marL="2228850" indent="-857250" algn="l" rtl="0" eaLnBrk="0" fontAlgn="base" hangingPunct="0">
+              <a:spcBef>
+                <a:spcPct val="0"/>
+              </a:spcBef>
+              <a:spcAft>
+                <a:spcPct val="0"/>
+              </a:spcAft>
+              <a:defRPr sz="3300">
+                <a:solidFill>
+                  <a:schemeClr val="tx1"/>
+                </a:solidFill>
+                <a:latin typeface="Bookman Old Style" pitchFamily="18" charset="0"/>
+              </a:defRPr>
+            </a:lvl8pPr>
+            <a:lvl9pPr marL="2686050" indent="-857250" algn="l" rtl="0" eaLnBrk="0" fontAlgn="base" hangingPunct="0">
+              <a:spcBef>
+                <a:spcPct val="0"/>
+              </a:spcBef>
+              <a:spcAft>
+                <a:spcPct val="0"/>
+              </a:spcAft>
+              <a:defRPr sz="3300">
+                <a:solidFill>
+                  <a:schemeClr val="tx1"/>
+                </a:solidFill>
+                <a:latin typeface="Bookman Old Style" pitchFamily="18" charset="0"/>
+              </a:defRPr>
+            </a:lvl9pPr>
+          </a:lstStyle>
+          <a:p>
+            <a:r>
+              <a:rPr lang="en-US" sz="2000" dirty="0" smtClean="0"/>
+              <a:t>Controller flow</a:t>
+            </a:r>
+            <a:endParaRPr lang="en-US" sz="2000" dirty="0"/>
+          </a:p>
+        </p:txBody>
+      </p:sp>
+    </p:spTree>
+    <p:extLst>
+      <p:ext uri="{BB962C8B-B14F-4D97-AF65-F5344CB8AC3E}">
+        <p14:creationId xmlns:p14="http://schemas.microsoft.com/office/powerpoint/2010/main" val="1162261057"/>
+      </p:ext>
+    </p:extLst>
+  </p:cSld>
+  <p:clrMapOvr>
+    <a:masterClrMapping/>
+  </p:clrMapOvr>
+  <mc:AlternateContent xmlns:mc="http://schemas.openxmlformats.org/markup-compatibility/2006" xmlns:p14="http://schemas.microsoft.com/office/powerpoint/2010/main">
+    <mc:Choice Requires="p14">
+      <p:transition p14:dur="10"/>
+    </mc:Choice>
+    <mc:Fallback xmlns="">
+      <p:transition/>
+    </mc:Fallback>
+  </mc:AlternateContent>
+  <p:timing>
+    <p:tnLst>
+      <p:par>
+        <p:cTn id="1" dur="indefinite" restart="never" nodeType="tmRoot"/>
       </p:par>
     </p:tnLst>
   </p:timing>

</xml_diff>

<commit_message>
FINAL FINAL FINAL presentation, for real
</commit_message>
<xml_diff>
--- a/docs/final-presentation/final-presentation.pptx
+++ b/docs/final-presentation/final-presentation.pptx
@@ -273,7 +273,7 @@
             <a:fld id="{D3646748-BC25-41CA-A659-7F968DC11A47}" type="datetime1">
               <a:rPr lang="en-US"/>
               <a:pPr/>
-              <a:t>6/17/2014</a:t>
+              <a:t>6/20/2014</a:t>
             </a:fld>
             <a:endParaRPr lang="en-US"/>
           </a:p>
@@ -5602,14 +5602,26 @@
             </a:r>
             <a:r>
               <a:rPr lang="nl-NL" dirty="0" smtClean="0"/>
-              <a:t> Doppler +</a:t>
-            </a:r>
-            <a:br>
+              <a:t> </a:t>
+            </a:r>
+            <a:r>
               <a:rPr lang="nl-NL" dirty="0" smtClean="0"/>
-            </a:br>
+              <a:t>Doppler</a:t>
+            </a:r>
+          </a:p>
+          <a:p>
+            <a:pPr lvl="1">
+              <a:lnSpc>
+                <a:spcPct val="150000"/>
+              </a:lnSpc>
+            </a:pPr>
             <a:r>
               <a:rPr lang="nl-NL" dirty="0" smtClean="0"/>
-              <a:t>more accurate </a:t>
+              <a:t>More </a:t>
+            </a:r>
+            <a:r>
+              <a:rPr lang="nl-NL" dirty="0" smtClean="0"/>
+              <a:t>accurate </a:t>
             </a:r>
             <a:r>
               <a:rPr lang="nl-NL" dirty="0" err="1" smtClean="0"/>
@@ -5835,11 +5847,7 @@
             </a:pPr>
             <a:r>
               <a:rPr lang="en-US" dirty="0" smtClean="0"/>
-              <a:t>Finally a short recap and possible future </a:t>
-            </a:r>
-            <a:r>
-              <a:rPr lang="en-US" dirty="0" smtClean="0"/>
-              <a:t>work</a:t>
+              <a:t>Finally a short recap and possible future work</a:t>
             </a:r>
           </a:p>
           <a:p>
@@ -5852,7 +5860,6 @@
               <a:rPr lang="en-US" dirty="0" smtClean="0"/>
               <a:t>(Interactive demo if desired?)</a:t>
             </a:r>
-            <a:endParaRPr lang="en-US" dirty="0" smtClean="0"/>
           </a:p>
           <a:p>
             <a:pPr>
@@ -5950,7 +5957,7 @@
           <a:graphicData uri="http://schemas.openxmlformats.org/presentationml/2006/ole">
             <mc:AlternateContent xmlns:mc="http://schemas.openxmlformats.org/markup-compatibility/2006">
               <mc:Choice xmlns:v="urn:schemas-microsoft-com:vml" Requires="v">
-                <p:oleObj spid="_x0000_s1032" name="Visio" r:id="rId3" imgW="6076891" imgH="3248120" progId="Visio.Drawing.15">
+                <p:oleObj spid="_x0000_s1034" name="Visio" r:id="rId3" imgW="6076891" imgH="3248120" progId="Visio.Drawing.15">
                   <p:embed/>
                 </p:oleObj>
               </mc:Choice>
@@ -7428,7 +7435,7 @@
           <a:graphicData uri="http://schemas.openxmlformats.org/presentationml/2006/ole">
             <mc:AlternateContent xmlns:mc="http://schemas.openxmlformats.org/markup-compatibility/2006">
               <mc:Choice xmlns:v="urn:schemas-microsoft-com:vml" Requires="v">
-                <p:oleObj spid="_x0000_s2056" name="Visio" r:id="rId3" imgW="6962804" imgH="4781526" progId="Visio.Drawing.15">
+                <p:oleObj spid="_x0000_s2058" name="Visio" r:id="rId3" imgW="6962804" imgH="4781526" progId="Visio.Drawing.15">
                   <p:embed/>
                 </p:oleObj>
               </mc:Choice>
@@ -7652,7 +7659,6 @@
               <a:rPr lang="en-US" sz="2000" dirty="0" smtClean="0"/>
               <a:t>Overview</a:t>
             </a:r>
-            <a:endParaRPr lang="en-US" sz="2000" dirty="0" smtClean="0"/>
           </a:p>
         </p:txBody>
       </p:sp>
@@ -7981,6 +7987,13 @@
   <p:clrMapOvr>
     <a:masterClrMapping/>
   </p:clrMapOvr>
+  <p:timing>
+    <p:tnLst>
+      <p:par>
+        <p:cTn id="1" dur="indefinite" restart="never" nodeType="tmRoot"/>
+      </p:par>
+    </p:tnLst>
+  </p:timing>
 </p:sld>
 </file>
 

</xml_diff>